<commit_message>
Adding repository name to PPTX slide
</commit_message>
<xml_diff>
--- a/Protecting Soybean Farmers from a scaling trade war.pptx
+++ b/Protecting Soybean Farmers from a scaling trade war.pptx
@@ -269,7 +269,7 @@
             <a:fld id="{ECD7D3A2-31E4-8E42-BFE4-E1D5C718E739}" type="datetimeFigureOut">
               <a:rPr lang="en-US" smtClean="0"/>
               <a:pPr/>
-              <a:t>12/2/2018</a:t>
+              <a:t>12/3/2018</a:t>
             </a:fld>
             <a:endParaRPr lang="en-US" dirty="0"/>
           </a:p>
@@ -437,7 +437,7 @@
             <a:fld id="{A20E2176-2878-124F-9D1F-E150291074BD}" type="datetimeFigureOut">
               <a:rPr lang="en-US" smtClean="0"/>
               <a:pPr/>
-              <a:t>12/2/2018</a:t>
+              <a:t>12/3/2018</a:t>
             </a:fld>
             <a:endParaRPr lang="en-US" dirty="0"/>
           </a:p>
@@ -501,38 +501,37 @@
           <a:p>
             <a:pPr lvl="0"/>
             <a:r>
-              <a:rPr lang="en-US" smtClean="0"/>
+              <a:rPr lang="en-US"/>
               <a:t>Click to edit Master text styles</a:t>
             </a:r>
           </a:p>
           <a:p>
             <a:pPr lvl="1"/>
             <a:r>
-              <a:rPr lang="en-US" smtClean="0"/>
+              <a:rPr lang="en-US"/>
               <a:t>Second level</a:t>
             </a:r>
           </a:p>
           <a:p>
             <a:pPr lvl="2"/>
             <a:r>
-              <a:rPr lang="en-US" smtClean="0"/>
+              <a:rPr lang="en-US"/>
               <a:t>Third level</a:t>
             </a:r>
           </a:p>
           <a:p>
             <a:pPr lvl="3"/>
             <a:r>
-              <a:rPr lang="en-US" smtClean="0"/>
+              <a:rPr lang="en-US"/>
               <a:t>Fourth level</a:t>
             </a:r>
           </a:p>
           <a:p>
             <a:pPr lvl="4"/>
             <a:r>
-              <a:rPr lang="en-US" smtClean="0"/>
+              <a:rPr lang="en-US"/>
               <a:t>Fifth level</a:t>
             </a:r>
-            <a:endParaRPr lang="en-US"/>
           </a:p>
         </p:txBody>
       </p:sp>
@@ -774,10 +773,9 @@
           </a:lstStyle>
           <a:p>
             <a:r>
-              <a:rPr lang="en-US" dirty="0" smtClean="0"/>
+              <a:rPr lang="en-US" dirty="0"/>
               <a:t>Click to add presentation title</a:t>
             </a:r>
-            <a:endParaRPr lang="en-US" dirty="0"/>
           </a:p>
         </p:txBody>
       </p:sp>
@@ -830,10 +828,9 @@
           </a:lstStyle>
           <a:p>
             <a:r>
-              <a:rPr lang="en-US" dirty="0" smtClean="0"/>
+              <a:rPr lang="en-US" dirty="0"/>
               <a:t>Click to add faculty name</a:t>
             </a:r>
-            <a:endParaRPr lang="en-US" dirty="0"/>
           </a:p>
         </p:txBody>
       </p:sp>
@@ -881,10 +878,9 @@
           </a:lstStyle>
           <a:p>
             <a:r>
-              <a:rPr lang="en-US" dirty="0" smtClean="0"/>
+              <a:rPr lang="en-US" dirty="0"/>
               <a:t>Drag image to placeholder or click icon to add</a:t>
             </a:r>
-            <a:endParaRPr lang="en-US" dirty="0"/>
           </a:p>
         </p:txBody>
       </p:sp>
@@ -952,7 +948,7 @@
           <a:p>
             <a:pPr lvl="0"/>
             <a:r>
-              <a:rPr lang="en-US" dirty="0" smtClean="0"/>
+              <a:rPr lang="en-US" dirty="0"/>
               <a:t>Click to add credits for others who contributed to this presentation</a:t>
             </a:r>
           </a:p>
@@ -1049,13 +1045,6 @@
   <p:clrMapOvr>
     <a:masterClrMapping/>
   </p:clrMapOvr>
-  <p:timing>
-    <p:tnLst>
-      <p:par>
-        <p:cTn id="1" dur="indefinite" restart="never" nodeType="tmRoot"/>
-      </p:par>
-    </p:tnLst>
-  </p:timing>
 </p:sldLayout>
 </file>
 
@@ -1114,10 +1103,9 @@
           </a:lstStyle>
           <a:p>
             <a:r>
-              <a:rPr lang="en-US" dirty="0" smtClean="0"/>
+              <a:rPr lang="en-US" dirty="0"/>
               <a:t>Click to add slide title</a:t>
             </a:r>
-            <a:endParaRPr lang="en-US" dirty="0"/>
           </a:p>
         </p:txBody>
       </p:sp>
@@ -1171,21 +1159,21 @@
           <a:p>
             <a:pPr lvl="0"/>
             <a:r>
-              <a:rPr lang="en-US" dirty="0" smtClean="0"/>
+              <a:rPr lang="en-US" dirty="0"/>
               <a:t>Click to add first-level bullet</a:t>
             </a:r>
           </a:p>
           <a:p>
             <a:pPr lvl="1"/>
             <a:r>
-              <a:rPr lang="en-US" dirty="0" smtClean="0"/>
+              <a:rPr lang="en-US" dirty="0"/>
               <a:t>Second level</a:t>
             </a:r>
           </a:p>
           <a:p>
             <a:pPr lvl="2"/>
             <a:r>
-              <a:rPr lang="en-US" dirty="0" smtClean="0"/>
+              <a:rPr lang="en-US" dirty="0"/>
               <a:t>Third level</a:t>
             </a:r>
           </a:p>
@@ -1243,7 +1231,7 @@
           <a:p>
             <a:pPr lvl="0"/>
             <a:r>
-              <a:rPr lang="en-US" dirty="0" smtClean="0"/>
+              <a:rPr lang="en-US" dirty="0"/>
               <a:t>Click to add caption</a:t>
             </a:r>
           </a:p>
@@ -1302,21 +1290,21 @@
           <a:p>
             <a:pPr lvl="0"/>
             <a:r>
-              <a:rPr lang="en-US" dirty="0" smtClean="0"/>
+              <a:rPr lang="en-US" dirty="0"/>
               <a:t>Click to add first-level bullet</a:t>
             </a:r>
           </a:p>
           <a:p>
             <a:pPr lvl="1"/>
             <a:r>
-              <a:rPr lang="en-US" dirty="0" smtClean="0"/>
+              <a:rPr lang="en-US" dirty="0"/>
               <a:t>Second level</a:t>
             </a:r>
           </a:p>
           <a:p>
             <a:pPr lvl="2"/>
             <a:r>
-              <a:rPr lang="en-US" dirty="0" smtClean="0"/>
+              <a:rPr lang="en-US" dirty="0"/>
               <a:t>Third level</a:t>
             </a:r>
           </a:p>
@@ -1374,7 +1362,7 @@
           <a:p>
             <a:pPr lvl="0"/>
             <a:r>
-              <a:rPr lang="en-US" dirty="0" smtClean="0"/>
+              <a:rPr lang="en-US" dirty="0"/>
               <a:t>Click to add caption</a:t>
             </a:r>
           </a:p>
@@ -1480,7 +1468,7 @@
           <a:p>
             <a:pPr lvl="0"/>
             <a:r>
-              <a:rPr lang="en-US" dirty="0" smtClean="0"/>
+              <a:rPr lang="en-US" dirty="0"/>
               <a:t>Click to add source information</a:t>
             </a:r>
           </a:p>
@@ -1586,7 +1574,7 @@
           <a:p>
             <a:pPr lvl="0"/>
             <a:r>
-              <a:rPr lang="en-US" dirty="0" smtClean="0"/>
+              <a:rPr lang="en-US" dirty="0"/>
               <a:t>Click to add source information</a:t>
             </a:r>
           </a:p>
@@ -1598,21 +1586,6 @@
   <p:clrMapOvr>
     <a:masterClrMapping/>
   </p:clrMapOvr>
-  <mc:AlternateContent xmlns:mc="http://schemas.openxmlformats.org/markup-compatibility/2006" xmlns:p14="http://schemas.microsoft.com/office/powerpoint/2010/main">
-    <mc:Choice Requires="p14">
-      <p:transition spd="slow" p14:dur="2000"/>
-    </mc:Choice>
-    <mc:Fallback xmlns="">
-      <p:transition spd="slow"/>
-    </mc:Fallback>
-  </mc:AlternateContent>
-  <p:timing>
-    <p:tnLst>
-      <p:par>
-        <p:cTn id="1" dur="indefinite" restart="never" nodeType="tmRoot"/>
-      </p:par>
-    </p:tnLst>
-  </p:timing>
 </p:sldLayout>
 </file>
 
@@ -1671,10 +1644,9 @@
           </a:lstStyle>
           <a:p>
             <a:r>
-              <a:rPr lang="en-US" dirty="0" smtClean="0"/>
+              <a:rPr lang="en-US" dirty="0"/>
               <a:t>Click to add slide title</a:t>
             </a:r>
-            <a:endParaRPr lang="en-US" dirty="0"/>
           </a:p>
         </p:txBody>
       </p:sp>
@@ -1730,7 +1702,7 @@
           <a:p>
             <a:pPr lvl="0"/>
             <a:r>
-              <a:rPr lang="en-US" dirty="0" smtClean="0"/>
+              <a:rPr lang="en-US" dirty="0"/>
               <a:t>Click to add caption</a:t>
             </a:r>
           </a:p>
@@ -1786,21 +1758,21 @@
           <a:p>
             <a:pPr lvl="0"/>
             <a:r>
-              <a:rPr lang="en-US" dirty="0" smtClean="0"/>
+              <a:rPr lang="en-US" dirty="0"/>
               <a:t>Click to add first-level bullet</a:t>
             </a:r>
           </a:p>
           <a:p>
             <a:pPr lvl="1"/>
             <a:r>
-              <a:rPr lang="en-US" dirty="0" smtClean="0"/>
+              <a:rPr lang="en-US" dirty="0"/>
               <a:t>Second level</a:t>
             </a:r>
           </a:p>
           <a:p>
             <a:pPr lvl="2"/>
             <a:r>
-              <a:rPr lang="en-US" dirty="0" smtClean="0"/>
+              <a:rPr lang="en-US" dirty="0"/>
               <a:t>Third level</a:t>
             </a:r>
           </a:p>
@@ -1858,7 +1830,7 @@
           <a:p>
             <a:pPr lvl="0"/>
             <a:r>
-              <a:rPr lang="en-US" dirty="0" smtClean="0"/>
+              <a:rPr lang="en-US" dirty="0"/>
               <a:t>Click to add caption</a:t>
             </a:r>
           </a:p>
@@ -1917,21 +1889,21 @@
           <a:p>
             <a:pPr lvl="0"/>
             <a:r>
-              <a:rPr lang="en-US" dirty="0" smtClean="0"/>
+              <a:rPr lang="en-US" dirty="0"/>
               <a:t>Click to add first-level bullet</a:t>
             </a:r>
           </a:p>
           <a:p>
             <a:pPr lvl="1"/>
             <a:r>
-              <a:rPr lang="en-US" dirty="0" smtClean="0"/>
+              <a:rPr lang="en-US" dirty="0"/>
               <a:t>Second level</a:t>
             </a:r>
           </a:p>
           <a:p>
             <a:pPr lvl="2"/>
             <a:r>
-              <a:rPr lang="en-US" dirty="0" smtClean="0"/>
+              <a:rPr lang="en-US" dirty="0"/>
               <a:t>Third level</a:t>
             </a:r>
           </a:p>
@@ -2037,7 +2009,7 @@
           <a:p>
             <a:pPr lvl="0"/>
             <a:r>
-              <a:rPr lang="en-US" dirty="0" smtClean="0"/>
+              <a:rPr lang="en-US" dirty="0"/>
               <a:t>Click to add source information</a:t>
             </a:r>
           </a:p>
@@ -2049,21 +2021,6 @@
   <p:clrMapOvr>
     <a:masterClrMapping/>
   </p:clrMapOvr>
-  <mc:AlternateContent xmlns:mc="http://schemas.openxmlformats.org/markup-compatibility/2006" xmlns:p14="http://schemas.microsoft.com/office/powerpoint/2010/main">
-    <mc:Choice Requires="p14">
-      <p:transition spd="slow" p14:dur="2000"/>
-    </mc:Choice>
-    <mc:Fallback xmlns="">
-      <p:transition spd="slow"/>
-    </mc:Fallback>
-  </mc:AlternateContent>
-  <p:timing>
-    <p:tnLst>
-      <p:par>
-        <p:cTn id="1" dur="indefinite" restart="never" nodeType="tmRoot"/>
-      </p:par>
-    </p:tnLst>
-  </p:timing>
 </p:sldLayout>
 </file>
 
@@ -2122,10 +2079,9 @@
           </a:lstStyle>
           <a:p>
             <a:r>
-              <a:rPr lang="en-US" dirty="0" smtClean="0"/>
+              <a:rPr lang="en-US" dirty="0"/>
               <a:t>Click to add slide title</a:t>
             </a:r>
-            <a:endParaRPr lang="en-US" dirty="0"/>
           </a:p>
         </p:txBody>
       </p:sp>
@@ -2181,7 +2137,7 @@
           <a:p>
             <a:pPr lvl="0"/>
             <a:r>
-              <a:rPr lang="en-US" dirty="0" smtClean="0"/>
+              <a:rPr lang="en-US" dirty="0"/>
               <a:t>Click to add quote</a:t>
             </a:r>
           </a:p>
@@ -2244,21 +2200,21 @@
           <a:p>
             <a:pPr lvl="0"/>
             <a:r>
-              <a:rPr lang="en-US" dirty="0" smtClean="0"/>
+              <a:rPr lang="en-US" dirty="0"/>
               <a:t>Click to add first-level bullet</a:t>
             </a:r>
           </a:p>
           <a:p>
             <a:pPr lvl="1"/>
             <a:r>
-              <a:rPr lang="en-US" dirty="0" smtClean="0"/>
+              <a:rPr lang="en-US" dirty="0"/>
               <a:t>Second level</a:t>
             </a:r>
           </a:p>
           <a:p>
             <a:pPr lvl="2"/>
             <a:r>
-              <a:rPr lang="en-US" dirty="0" smtClean="0"/>
+              <a:rPr lang="en-US" dirty="0"/>
               <a:t>Third level</a:t>
             </a:r>
           </a:p>
@@ -2364,7 +2320,7 @@
           <a:p>
             <a:pPr lvl="0"/>
             <a:r>
-              <a:rPr lang="en-US" dirty="0" smtClean="0"/>
+              <a:rPr lang="en-US" dirty="0"/>
               <a:t>Click to add source information</a:t>
             </a:r>
           </a:p>
@@ -2376,21 +2332,6 @@
   <p:clrMapOvr>
     <a:masterClrMapping/>
   </p:clrMapOvr>
-  <mc:AlternateContent xmlns:mc="http://schemas.openxmlformats.org/markup-compatibility/2006" xmlns:p14="http://schemas.microsoft.com/office/powerpoint/2010/main">
-    <mc:Choice Requires="p14">
-      <p:transition spd="slow" p14:dur="2000"/>
-    </mc:Choice>
-    <mc:Fallback xmlns="">
-      <p:transition spd="slow"/>
-    </mc:Fallback>
-  </mc:AlternateContent>
-  <p:timing>
-    <p:tnLst>
-      <p:par>
-        <p:cTn id="1" dur="indefinite" restart="never" nodeType="tmRoot"/>
-      </p:par>
-    </p:tnLst>
-  </p:timing>
 </p:sldLayout>
 </file>
 
@@ -2435,10 +2376,9 @@
           <a:lstStyle/>
           <a:p>
             <a:r>
-              <a:rPr lang="en-US" dirty="0" smtClean="0"/>
+              <a:rPr lang="en-US" dirty="0"/>
               <a:t>Click to add slide title</a:t>
             </a:r>
-            <a:endParaRPr lang="en-US" dirty="0"/>
           </a:p>
         </p:txBody>
       </p:sp>
@@ -2472,7 +2412,7 @@
           <a:p>
             <a:pPr lvl="0"/>
             <a:r>
-              <a:rPr lang="en-US" dirty="0" smtClean="0"/>
+              <a:rPr lang="en-US" dirty="0"/>
               <a:t>Click to add table title</a:t>
             </a:r>
           </a:p>
@@ -2525,21 +2465,21 @@
           <a:p>
             <a:pPr lvl="0"/>
             <a:r>
-              <a:rPr lang="en-US" dirty="0" smtClean="0"/>
+              <a:rPr lang="en-US" dirty="0"/>
               <a:t>Click to add first-level bullet</a:t>
             </a:r>
           </a:p>
           <a:p>
             <a:pPr lvl="1"/>
             <a:r>
-              <a:rPr lang="en-US" dirty="0" smtClean="0"/>
+              <a:rPr lang="en-US" dirty="0"/>
               <a:t>Second level</a:t>
             </a:r>
           </a:p>
           <a:p>
             <a:pPr lvl="2"/>
             <a:r>
-              <a:rPr lang="en-US" dirty="0" smtClean="0"/>
+              <a:rPr lang="en-US" dirty="0"/>
               <a:t>Third level</a:t>
             </a:r>
           </a:p>
@@ -2645,7 +2585,7 @@
           <a:p>
             <a:pPr lvl="0"/>
             <a:r>
-              <a:rPr lang="en-US" dirty="0" smtClean="0"/>
+              <a:rPr lang="en-US" dirty="0"/>
               <a:t>Click to add source information</a:t>
             </a:r>
           </a:p>
@@ -2657,13 +2597,6 @@
   <p:clrMapOvr>
     <a:masterClrMapping/>
   </p:clrMapOvr>
-  <p:timing>
-    <p:tnLst>
-      <p:par>
-        <p:cTn id="1" dur="indefinite" restart="never" nodeType="tmRoot"/>
-      </p:par>
-    </p:tnLst>
-  </p:timing>
 </p:sldLayout>
 </file>
 
@@ -2722,10 +2655,9 @@
           </a:lstStyle>
           <a:p>
             <a:r>
-              <a:rPr lang="en-US" dirty="0" smtClean="0"/>
+              <a:rPr lang="en-US" dirty="0"/>
               <a:t>Click to add slide title</a:t>
             </a:r>
-            <a:endParaRPr lang="en-US" dirty="0"/>
           </a:p>
         </p:txBody>
       </p:sp>
@@ -2759,7 +2691,7 @@
           <a:p>
             <a:pPr lvl="0"/>
             <a:r>
-              <a:rPr lang="en-US" dirty="0" smtClean="0"/>
+              <a:rPr lang="en-US" dirty="0"/>
               <a:t>Click to add table title</a:t>
             </a:r>
           </a:p>
@@ -2818,21 +2750,21 @@
           <a:p>
             <a:pPr lvl="0"/>
             <a:r>
-              <a:rPr lang="en-US" dirty="0" smtClean="0"/>
+              <a:rPr lang="en-US" dirty="0"/>
               <a:t>Click to add first-level bullet</a:t>
             </a:r>
           </a:p>
           <a:p>
             <a:pPr lvl="1"/>
             <a:r>
-              <a:rPr lang="en-US" dirty="0" smtClean="0"/>
+              <a:rPr lang="en-US" dirty="0"/>
               <a:t>Second level</a:t>
             </a:r>
           </a:p>
           <a:p>
             <a:pPr lvl="2"/>
             <a:r>
-              <a:rPr lang="en-US" dirty="0" smtClean="0"/>
+              <a:rPr lang="en-US" dirty="0"/>
               <a:t>Third level</a:t>
             </a:r>
           </a:p>
@@ -2891,21 +2823,21 @@
           <a:p>
             <a:pPr lvl="0"/>
             <a:r>
-              <a:rPr lang="en-US" dirty="0" smtClean="0"/>
+              <a:rPr lang="en-US" dirty="0"/>
               <a:t>Click to add first-level bullet</a:t>
             </a:r>
           </a:p>
           <a:p>
             <a:pPr lvl="1"/>
             <a:r>
-              <a:rPr lang="en-US" dirty="0" smtClean="0"/>
+              <a:rPr lang="en-US" dirty="0"/>
               <a:t>Second level</a:t>
             </a:r>
           </a:p>
           <a:p>
             <a:pPr lvl="2"/>
             <a:r>
-              <a:rPr lang="en-US" dirty="0" smtClean="0"/>
+              <a:rPr lang="en-US" dirty="0"/>
               <a:t>Third level</a:t>
             </a:r>
           </a:p>
@@ -3011,7 +2943,7 @@
           <a:p>
             <a:pPr lvl="0"/>
             <a:r>
-              <a:rPr lang="en-US" dirty="0" smtClean="0"/>
+              <a:rPr lang="en-US" dirty="0"/>
               <a:t>Click to add source information</a:t>
             </a:r>
           </a:p>
@@ -3027,21 +2959,6 @@
   <p:clrMapOvr>
     <a:masterClrMapping/>
   </p:clrMapOvr>
-  <mc:AlternateContent xmlns:mc="http://schemas.openxmlformats.org/markup-compatibility/2006" xmlns:p14="http://schemas.microsoft.com/office/powerpoint/2010/main">
-    <mc:Choice Requires="p14">
-      <p:transition spd="slow" p14:dur="2000"/>
-    </mc:Choice>
-    <mc:Fallback xmlns="">
-      <p:transition spd="slow"/>
-    </mc:Fallback>
-  </mc:AlternateContent>
-  <p:timing>
-    <p:tnLst>
-      <p:par>
-        <p:cTn id="1" dur="indefinite" restart="never" nodeType="tmRoot"/>
-      </p:par>
-    </p:tnLst>
-  </p:timing>
 </p:sldLayout>
 </file>
 
@@ -3100,10 +3017,9 @@
           </a:lstStyle>
           <a:p>
             <a:r>
-              <a:rPr lang="en-US" dirty="0" smtClean="0"/>
+              <a:rPr lang="en-US" dirty="0"/>
               <a:t>Click to add slide title</a:t>
             </a:r>
-            <a:endParaRPr lang="en-US" dirty="0"/>
           </a:p>
         </p:txBody>
       </p:sp>
@@ -3160,21 +3076,21 @@
           <a:p>
             <a:pPr lvl="0"/>
             <a:r>
-              <a:rPr lang="en-US" dirty="0" smtClean="0"/>
+              <a:rPr lang="en-US" dirty="0"/>
               <a:t>Click to add first-level bullet</a:t>
             </a:r>
           </a:p>
           <a:p>
             <a:pPr lvl="1"/>
             <a:r>
-              <a:rPr lang="en-US" dirty="0" smtClean="0"/>
+              <a:rPr lang="en-US" dirty="0"/>
               <a:t>Second level</a:t>
             </a:r>
           </a:p>
           <a:p>
             <a:pPr lvl="2"/>
             <a:r>
-              <a:rPr lang="en-US" dirty="0" smtClean="0"/>
+              <a:rPr lang="en-US" dirty="0"/>
               <a:t>Third level</a:t>
             </a:r>
           </a:p>
@@ -3210,7 +3126,7 @@
           <a:p>
             <a:pPr lvl="0"/>
             <a:r>
-              <a:rPr lang="en-US" dirty="0" smtClean="0"/>
+              <a:rPr lang="en-US" dirty="0"/>
               <a:t>Click to add table title</a:t>
             </a:r>
           </a:p>
@@ -3269,21 +3185,21 @@
           <a:p>
             <a:pPr lvl="0"/>
             <a:r>
-              <a:rPr lang="en-US" dirty="0" smtClean="0"/>
+              <a:rPr lang="en-US" dirty="0"/>
               <a:t>Click to add first-level bullet</a:t>
             </a:r>
           </a:p>
           <a:p>
             <a:pPr lvl="1"/>
             <a:r>
-              <a:rPr lang="en-US" dirty="0" smtClean="0"/>
+              <a:rPr lang="en-US" dirty="0"/>
               <a:t>Second level</a:t>
             </a:r>
           </a:p>
           <a:p>
             <a:pPr lvl="2"/>
             <a:r>
-              <a:rPr lang="en-US" dirty="0" smtClean="0"/>
+              <a:rPr lang="en-US" dirty="0"/>
               <a:t>Third level</a:t>
             </a:r>
           </a:p>
@@ -3389,7 +3305,7 @@
           <a:p>
             <a:pPr lvl="0"/>
             <a:r>
-              <a:rPr lang="en-US" dirty="0" smtClean="0"/>
+              <a:rPr lang="en-US" dirty="0"/>
               <a:t>Click to add source information</a:t>
             </a:r>
           </a:p>
@@ -3401,21 +3317,6 @@
   <p:clrMapOvr>
     <a:masterClrMapping/>
   </p:clrMapOvr>
-  <mc:AlternateContent xmlns:mc="http://schemas.openxmlformats.org/markup-compatibility/2006" xmlns:p14="http://schemas.microsoft.com/office/powerpoint/2010/main">
-    <mc:Choice Requires="p14">
-      <p:transition spd="slow" p14:dur="2000"/>
-    </mc:Choice>
-    <mc:Fallback xmlns="">
-      <p:transition spd="slow"/>
-    </mc:Fallback>
-  </mc:AlternateContent>
-  <p:timing>
-    <p:tnLst>
-      <p:par>
-        <p:cTn id="1" dur="indefinite" restart="never" nodeType="tmRoot"/>
-      </p:par>
-    </p:tnLst>
-  </p:timing>
 </p:sldLayout>
 </file>
 
@@ -3474,10 +3375,9 @@
           </a:lstStyle>
           <a:p>
             <a:r>
-              <a:rPr lang="en-US" dirty="0" smtClean="0"/>
+              <a:rPr lang="en-US" dirty="0"/>
               <a:t>Click to add slide title</a:t>
             </a:r>
-            <a:endParaRPr lang="en-US" dirty="0"/>
           </a:p>
         </p:txBody>
       </p:sp>
@@ -3534,21 +3434,21 @@
           <a:p>
             <a:pPr lvl="0"/>
             <a:r>
-              <a:rPr lang="en-US" dirty="0" smtClean="0"/>
+              <a:rPr lang="en-US" dirty="0"/>
               <a:t>Click to add first-level bullet</a:t>
             </a:r>
           </a:p>
           <a:p>
             <a:pPr lvl="1"/>
             <a:r>
-              <a:rPr lang="en-US" dirty="0" smtClean="0"/>
+              <a:rPr lang="en-US" dirty="0"/>
               <a:t>Second level</a:t>
             </a:r>
           </a:p>
           <a:p>
             <a:pPr lvl="2"/>
             <a:r>
-              <a:rPr lang="en-US" dirty="0" smtClean="0"/>
+              <a:rPr lang="en-US" dirty="0"/>
               <a:t>Third level</a:t>
             </a:r>
           </a:p>
@@ -3607,21 +3507,21 @@
           <a:p>
             <a:pPr lvl="0"/>
             <a:r>
-              <a:rPr lang="en-US" dirty="0" smtClean="0"/>
+              <a:rPr lang="en-US" dirty="0"/>
               <a:t>Click to add first-level bullet</a:t>
             </a:r>
           </a:p>
           <a:p>
             <a:pPr lvl="1"/>
             <a:r>
-              <a:rPr lang="en-US" dirty="0" smtClean="0"/>
+              <a:rPr lang="en-US" dirty="0"/>
               <a:t>Second level</a:t>
             </a:r>
           </a:p>
           <a:p>
             <a:pPr lvl="2"/>
             <a:r>
-              <a:rPr lang="en-US" dirty="0" smtClean="0"/>
+              <a:rPr lang="en-US" dirty="0"/>
               <a:t>Third level</a:t>
             </a:r>
           </a:p>
@@ -3680,21 +3580,21 @@
           <a:p>
             <a:pPr lvl="0"/>
             <a:r>
-              <a:rPr lang="en-US" dirty="0" smtClean="0"/>
+              <a:rPr lang="en-US" dirty="0"/>
               <a:t>Click to add first-level bullet</a:t>
             </a:r>
           </a:p>
           <a:p>
             <a:pPr lvl="1"/>
             <a:r>
-              <a:rPr lang="en-US" dirty="0" smtClean="0"/>
+              <a:rPr lang="en-US" dirty="0"/>
               <a:t>Second level</a:t>
             </a:r>
           </a:p>
           <a:p>
             <a:pPr lvl="2"/>
             <a:r>
-              <a:rPr lang="en-US" dirty="0" smtClean="0"/>
+              <a:rPr lang="en-US" dirty="0"/>
               <a:t>Third level</a:t>
             </a:r>
           </a:p>
@@ -3800,7 +3700,7 @@
           <a:p>
             <a:pPr lvl="0"/>
             <a:r>
-              <a:rPr lang="en-US" dirty="0" smtClean="0"/>
+              <a:rPr lang="en-US" dirty="0"/>
               <a:t>Click to add source information</a:t>
             </a:r>
           </a:p>
@@ -3816,21 +3716,6 @@
   <p:clrMapOvr>
     <a:masterClrMapping/>
   </p:clrMapOvr>
-  <mc:AlternateContent xmlns:mc="http://schemas.openxmlformats.org/markup-compatibility/2006" xmlns:p14="http://schemas.microsoft.com/office/powerpoint/2010/main">
-    <mc:Choice Requires="p14">
-      <p:transition spd="slow" p14:dur="2000"/>
-    </mc:Choice>
-    <mc:Fallback xmlns="">
-      <p:transition spd="slow"/>
-    </mc:Fallback>
-  </mc:AlternateContent>
-  <p:timing>
-    <p:tnLst>
-      <p:par>
-        <p:cTn id="1" dur="indefinite" restart="never" nodeType="tmRoot"/>
-      </p:par>
-    </p:tnLst>
-  </p:timing>
 </p:sldLayout>
 </file>
 
@@ -3889,10 +3774,9 @@
           </a:lstStyle>
           <a:p>
             <a:r>
-              <a:rPr lang="en-US" dirty="0" smtClean="0"/>
+              <a:rPr lang="en-US" dirty="0"/>
               <a:t>Click to add slide title</a:t>
             </a:r>
-            <a:endParaRPr lang="en-US" dirty="0"/>
           </a:p>
         </p:txBody>
       </p:sp>
@@ -3953,21 +3837,21 @@
           <a:p>
             <a:pPr lvl="0"/>
             <a:r>
-              <a:rPr lang="en-US" dirty="0" smtClean="0"/>
+              <a:rPr lang="en-US" dirty="0"/>
               <a:t>Click to add first-level bullet</a:t>
             </a:r>
           </a:p>
           <a:p>
             <a:pPr lvl="1"/>
             <a:r>
-              <a:rPr lang="en-US" dirty="0" smtClean="0"/>
+              <a:rPr lang="en-US" dirty="0"/>
               <a:t>Second level</a:t>
             </a:r>
           </a:p>
           <a:p>
             <a:pPr lvl="2"/>
             <a:r>
-              <a:rPr lang="en-US" dirty="0" smtClean="0"/>
+              <a:rPr lang="en-US" dirty="0"/>
               <a:t>Third level</a:t>
             </a:r>
           </a:p>
@@ -4025,7 +3909,7 @@
           <a:p>
             <a:pPr lvl="0"/>
             <a:r>
-              <a:rPr lang="en-US" dirty="0" smtClean="0"/>
+              <a:rPr lang="en-US" dirty="0"/>
               <a:t>Click to add caption</a:t>
             </a:r>
           </a:p>
@@ -4088,21 +3972,21 @@
           <a:p>
             <a:pPr lvl="0"/>
             <a:r>
-              <a:rPr lang="en-US" dirty="0" smtClean="0"/>
+              <a:rPr lang="en-US" dirty="0"/>
               <a:t>Click to add first-level bullet</a:t>
             </a:r>
           </a:p>
           <a:p>
             <a:pPr lvl="1"/>
             <a:r>
-              <a:rPr lang="en-US" dirty="0" smtClean="0"/>
+              <a:rPr lang="en-US" dirty="0"/>
               <a:t>Second level</a:t>
             </a:r>
           </a:p>
           <a:p>
             <a:pPr lvl="2"/>
             <a:r>
-              <a:rPr lang="en-US" dirty="0" smtClean="0"/>
+              <a:rPr lang="en-US" dirty="0"/>
               <a:t>Third level</a:t>
             </a:r>
           </a:p>
@@ -4160,7 +4044,7 @@
           <a:p>
             <a:pPr lvl="0"/>
             <a:r>
-              <a:rPr lang="en-US" dirty="0" smtClean="0"/>
+              <a:rPr lang="en-US" dirty="0"/>
               <a:t>Click to add caption</a:t>
             </a:r>
           </a:p>
@@ -4223,21 +4107,21 @@
           <a:p>
             <a:pPr lvl="0"/>
             <a:r>
-              <a:rPr lang="en-US" dirty="0" smtClean="0"/>
+              <a:rPr lang="en-US" dirty="0"/>
               <a:t>Click to add first-level bullet</a:t>
             </a:r>
           </a:p>
           <a:p>
             <a:pPr lvl="1"/>
             <a:r>
-              <a:rPr lang="en-US" dirty="0" smtClean="0"/>
+              <a:rPr lang="en-US" dirty="0"/>
               <a:t>Second level</a:t>
             </a:r>
           </a:p>
           <a:p>
             <a:pPr lvl="2"/>
             <a:r>
-              <a:rPr lang="en-US" dirty="0" smtClean="0"/>
+              <a:rPr lang="en-US" dirty="0"/>
               <a:t>Third level</a:t>
             </a:r>
           </a:p>
@@ -4295,7 +4179,7 @@
           <a:p>
             <a:pPr lvl="0"/>
             <a:r>
-              <a:rPr lang="en-US" dirty="0" smtClean="0"/>
+              <a:rPr lang="en-US" dirty="0"/>
               <a:t>Click to add caption</a:t>
             </a:r>
           </a:p>
@@ -4401,7 +4285,7 @@
           <a:p>
             <a:pPr lvl="0"/>
             <a:r>
-              <a:rPr lang="en-US" dirty="0" smtClean="0"/>
+              <a:rPr lang="en-US" dirty="0"/>
               <a:t>Click to add source information</a:t>
             </a:r>
           </a:p>
@@ -4413,21 +4297,6 @@
   <p:clrMapOvr>
     <a:masterClrMapping/>
   </p:clrMapOvr>
-  <mc:AlternateContent xmlns:mc="http://schemas.openxmlformats.org/markup-compatibility/2006" xmlns:p14="http://schemas.microsoft.com/office/powerpoint/2010/main">
-    <mc:Choice Requires="p14">
-      <p:transition spd="slow" p14:dur="2000"/>
-    </mc:Choice>
-    <mc:Fallback xmlns="">
-      <p:transition spd="slow"/>
-    </mc:Fallback>
-  </mc:AlternateContent>
-  <p:timing>
-    <p:tnLst>
-      <p:par>
-        <p:cTn id="1" dur="indefinite" restart="never" nodeType="tmRoot"/>
-      </p:par>
-    </p:tnLst>
-  </p:timing>
 </p:sldLayout>
 </file>
 
@@ -4486,10 +4355,9 @@
           </a:lstStyle>
           <a:p>
             <a:r>
-              <a:rPr lang="en-US" dirty="0" smtClean="0"/>
+              <a:rPr lang="en-US" dirty="0"/>
               <a:t>Click to add slide title</a:t>
             </a:r>
-            <a:endParaRPr lang="en-US" dirty="0"/>
           </a:p>
         </p:txBody>
       </p:sp>
@@ -4545,7 +4413,7 @@
           <a:p>
             <a:pPr lvl="0"/>
             <a:r>
-              <a:rPr lang="en-US" dirty="0" smtClean="0"/>
+              <a:rPr lang="en-US" dirty="0"/>
               <a:t>Click to add caption</a:t>
             </a:r>
           </a:p>
@@ -4604,21 +4472,21 @@
           <a:p>
             <a:pPr lvl="0"/>
             <a:r>
-              <a:rPr lang="en-US" dirty="0" smtClean="0"/>
+              <a:rPr lang="en-US" dirty="0"/>
               <a:t>Click to add first-level bullet</a:t>
             </a:r>
           </a:p>
           <a:p>
             <a:pPr lvl="1"/>
             <a:r>
-              <a:rPr lang="en-US" dirty="0" smtClean="0"/>
+              <a:rPr lang="en-US" dirty="0"/>
               <a:t>Second level</a:t>
             </a:r>
           </a:p>
           <a:p>
             <a:pPr lvl="2"/>
             <a:r>
-              <a:rPr lang="en-US" dirty="0" smtClean="0"/>
+              <a:rPr lang="en-US" dirty="0"/>
               <a:t>Third level</a:t>
             </a:r>
           </a:p>
@@ -4676,7 +4544,7 @@
           <a:p>
             <a:pPr lvl="0"/>
             <a:r>
-              <a:rPr lang="en-US" dirty="0" smtClean="0"/>
+              <a:rPr lang="en-US" dirty="0"/>
               <a:t>Click to add caption</a:t>
             </a:r>
           </a:p>
@@ -4735,21 +4603,21 @@
           <a:p>
             <a:pPr lvl="0"/>
             <a:r>
-              <a:rPr lang="en-US" dirty="0" smtClean="0"/>
+              <a:rPr lang="en-US" dirty="0"/>
               <a:t>Click to add first-level bullet</a:t>
             </a:r>
           </a:p>
           <a:p>
             <a:pPr lvl="1"/>
             <a:r>
-              <a:rPr lang="en-US" dirty="0" smtClean="0"/>
+              <a:rPr lang="en-US" dirty="0"/>
               <a:t>Second level</a:t>
             </a:r>
           </a:p>
           <a:p>
             <a:pPr lvl="2"/>
             <a:r>
-              <a:rPr lang="en-US" dirty="0" smtClean="0"/>
+              <a:rPr lang="en-US" dirty="0"/>
               <a:t>Third level</a:t>
             </a:r>
           </a:p>
@@ -4807,7 +4675,7 @@
           <a:p>
             <a:pPr lvl="0"/>
             <a:r>
-              <a:rPr lang="en-US" dirty="0" smtClean="0"/>
+              <a:rPr lang="en-US" dirty="0"/>
               <a:t>Click to add caption</a:t>
             </a:r>
           </a:p>
@@ -4866,21 +4734,21 @@
           <a:p>
             <a:pPr lvl="0"/>
             <a:r>
-              <a:rPr lang="en-US" dirty="0" smtClean="0"/>
+              <a:rPr lang="en-US" dirty="0"/>
               <a:t>Click to add first-level bullet</a:t>
             </a:r>
           </a:p>
           <a:p>
             <a:pPr lvl="1"/>
             <a:r>
-              <a:rPr lang="en-US" dirty="0" smtClean="0"/>
+              <a:rPr lang="en-US" dirty="0"/>
               <a:t>Second level</a:t>
             </a:r>
           </a:p>
           <a:p>
             <a:pPr lvl="2"/>
             <a:r>
-              <a:rPr lang="en-US" dirty="0" smtClean="0"/>
+              <a:rPr lang="en-US" dirty="0"/>
               <a:t>Third level</a:t>
             </a:r>
           </a:p>
@@ -4986,7 +4854,7 @@
           <a:p>
             <a:pPr lvl="0"/>
             <a:r>
-              <a:rPr lang="en-US" dirty="0" smtClean="0"/>
+              <a:rPr lang="en-US" dirty="0"/>
               <a:t>Click to add source information</a:t>
             </a:r>
           </a:p>
@@ -4998,21 +4866,6 @@
   <p:clrMapOvr>
     <a:masterClrMapping/>
   </p:clrMapOvr>
-  <mc:AlternateContent xmlns:mc="http://schemas.openxmlformats.org/markup-compatibility/2006" xmlns:p14="http://schemas.microsoft.com/office/powerpoint/2010/main">
-    <mc:Choice Requires="p14">
-      <p:transition spd="slow" p14:dur="2000"/>
-    </mc:Choice>
-    <mc:Fallback xmlns="">
-      <p:transition spd="slow"/>
-    </mc:Fallback>
-  </mc:AlternateContent>
-  <p:timing>
-    <p:tnLst>
-      <p:par>
-        <p:cTn id="1" dur="indefinite" restart="never" nodeType="tmRoot"/>
-      </p:par>
-    </p:tnLst>
-  </p:timing>
 </p:sldLayout>
 </file>
 
@@ -5062,10 +4915,9 @@
           </a:lstStyle>
           <a:p>
             <a:r>
-              <a:rPr lang="en-US" dirty="0" smtClean="0"/>
+              <a:rPr lang="en-US" dirty="0"/>
               <a:t>Select “Title 1” in Selection Pane &amp; type to add hidden slide title.</a:t>
             </a:r>
-            <a:endParaRPr lang="en-US" dirty="0"/>
           </a:p>
         </p:txBody>
       </p:sp>
@@ -5099,10 +4951,9 @@
           </a:lstStyle>
           <a:p>
             <a:r>
-              <a:rPr lang="en-US" dirty="0" smtClean="0"/>
+              <a:rPr lang="en-US" dirty="0"/>
               <a:t>Click icon to add full-slide image</a:t>
             </a:r>
-            <a:endParaRPr lang="en-US" dirty="0"/>
           </a:p>
         </p:txBody>
       </p:sp>
@@ -5206,7 +5057,7 @@
           <a:p>
             <a:pPr lvl="0"/>
             <a:r>
-              <a:rPr lang="en-US" dirty="0" smtClean="0"/>
+              <a:rPr lang="en-US" dirty="0"/>
               <a:t>Click to add source information</a:t>
             </a:r>
           </a:p>
@@ -5222,13 +5073,6 @@
   <p:clrMapOvr>
     <a:masterClrMapping/>
   </p:clrMapOvr>
-  <p:timing>
-    <p:tnLst>
-      <p:par>
-        <p:cTn id="1" dur="indefinite" restart="never" nodeType="tmRoot"/>
-      </p:par>
-    </p:tnLst>
-  </p:timing>
 </p:sldLayout>
 </file>
 
@@ -5299,10 +5143,9 @@
           </a:lstStyle>
           <a:p>
             <a:r>
-              <a:rPr lang="en-US" dirty="0" smtClean="0"/>
+              <a:rPr lang="en-US" dirty="0"/>
               <a:t>Click to add presentation title</a:t>
             </a:r>
-            <a:endParaRPr lang="en-US" dirty="0"/>
           </a:p>
         </p:txBody>
       </p:sp>
@@ -5355,10 +5198,9 @@
           </a:lstStyle>
           <a:p>
             <a:r>
-              <a:rPr lang="en-US" dirty="0" smtClean="0"/>
+              <a:rPr lang="en-US" dirty="0"/>
               <a:t>Click to add faculty 1 name</a:t>
             </a:r>
-            <a:endParaRPr lang="en-US" dirty="0"/>
           </a:p>
         </p:txBody>
       </p:sp>
@@ -5406,10 +5248,9 @@
           </a:lstStyle>
           <a:p>
             <a:r>
-              <a:rPr lang="en-US" dirty="0" smtClean="0"/>
+              <a:rPr lang="en-US" dirty="0"/>
               <a:t>Drag image to placeholder or click icon to add</a:t>
             </a:r>
-            <a:endParaRPr lang="en-US" dirty="0"/>
           </a:p>
         </p:txBody>
       </p:sp>
@@ -5466,7 +5307,7 @@
           <a:p>
             <a:pPr lvl="0"/>
             <a:r>
-              <a:rPr lang="en-US" dirty="0" smtClean="0"/>
+              <a:rPr lang="en-US" dirty="0"/>
               <a:t>Click to add faculty 2 name</a:t>
             </a:r>
           </a:p>
@@ -5516,10 +5357,9 @@
           </a:lstStyle>
           <a:p>
             <a:r>
-              <a:rPr lang="en-US" dirty="0" smtClean="0"/>
+              <a:rPr lang="en-US" dirty="0"/>
               <a:t>Drag image to placeholder or click icon to add</a:t>
             </a:r>
-            <a:endParaRPr lang="en-US" dirty="0"/>
           </a:p>
         </p:txBody>
       </p:sp>
@@ -5587,7 +5427,7 @@
           <a:p>
             <a:pPr lvl="0"/>
             <a:r>
-              <a:rPr lang="en-US" dirty="0" smtClean="0"/>
+              <a:rPr lang="en-US" dirty="0"/>
               <a:t>Click to add credits for others who contributed to this presentation</a:t>
             </a:r>
           </a:p>
@@ -5684,13 +5524,6 @@
   <p:clrMapOvr>
     <a:masterClrMapping/>
   </p:clrMapOvr>
-  <p:timing>
-    <p:tnLst>
-      <p:par>
-        <p:cTn id="1" dur="indefinite" restart="never" nodeType="tmRoot"/>
-      </p:par>
-    </p:tnLst>
-  </p:timing>
 </p:sldLayout>
 </file>
 
@@ -5741,10 +5574,9 @@
           </a:lstStyle>
           <a:p>
             <a:r>
-              <a:rPr lang="en-US" dirty="0" smtClean="0"/>
+              <a:rPr lang="en-US" dirty="0"/>
               <a:t>Click to add slide title</a:t>
             </a:r>
-            <a:endParaRPr lang="en-US" dirty="0"/>
           </a:p>
         </p:txBody>
       </p:sp>
@@ -5774,10 +5606,9 @@
           </a:lstStyle>
           <a:p>
             <a:r>
-              <a:rPr lang="en-US" dirty="0" smtClean="0"/>
+              <a:rPr lang="en-US" dirty="0"/>
               <a:t>Click to add image or drag and drop image to placeholder</a:t>
             </a:r>
-            <a:endParaRPr lang="en-US" dirty="0"/>
           </a:p>
         </p:txBody>
       </p:sp>
@@ -5881,7 +5712,7 @@
           <a:p>
             <a:pPr lvl="0"/>
             <a:r>
-              <a:rPr lang="en-US" dirty="0" smtClean="0"/>
+              <a:rPr lang="en-US" dirty="0"/>
               <a:t>Click to add source information</a:t>
             </a:r>
           </a:p>
@@ -5897,13 +5728,6 @@
   <p:clrMapOvr>
     <a:masterClrMapping/>
   </p:clrMapOvr>
-  <p:timing>
-    <p:tnLst>
-      <p:par>
-        <p:cTn id="1" dur="indefinite" restart="never" nodeType="tmRoot"/>
-      </p:par>
-    </p:tnLst>
-  </p:timing>
 </p:sldLayout>
 </file>
 
@@ -5944,10 +5768,9 @@
           </a:lstStyle>
           <a:p>
             <a:r>
-              <a:rPr lang="en-US" dirty="0" smtClean="0"/>
+              <a:rPr lang="en-US" dirty="0"/>
               <a:t>Click to add title</a:t>
             </a:r>
-            <a:endParaRPr lang="en-US" dirty="0"/>
           </a:p>
         </p:txBody>
       </p:sp>
@@ -5980,10 +5803,9 @@
           </a:lstStyle>
           <a:p>
             <a:r>
-              <a:rPr lang="en-US" dirty="0" smtClean="0"/>
+              <a:rPr lang="en-US" dirty="0"/>
               <a:t>Click icon to add image or drag and drop image to placeholder</a:t>
             </a:r>
-            <a:endParaRPr lang="en-US" dirty="0"/>
           </a:p>
         </p:txBody>
       </p:sp>
@@ -6090,7 +5912,7 @@
           <a:p>
             <a:pPr lvl="0"/>
             <a:r>
-              <a:rPr lang="en-US" dirty="0" smtClean="0"/>
+              <a:rPr lang="en-US" dirty="0"/>
               <a:t>Click to add source information</a:t>
             </a:r>
           </a:p>
@@ -6106,13 +5928,6 @@
   <p:clrMapOvr>
     <a:masterClrMapping/>
   </p:clrMapOvr>
-  <p:timing>
-    <p:tnLst>
-      <p:par>
-        <p:cTn id="1" dur="indefinite" restart="never" nodeType="tmRoot"/>
-      </p:par>
-    </p:tnLst>
-  </p:timing>
   <p:extLst mod="1">
     <p:ext uri="{DCECCB84-F9BA-43D5-87BE-67443E8EF086}">
       <p15:sldGuideLst xmlns:p15="http://schemas.microsoft.com/office/powerpoint/2012/main">
@@ -6173,10 +5988,9 @@
           <a:lstStyle/>
           <a:p>
             <a:r>
-              <a:rPr lang="en-US" dirty="0" smtClean="0"/>
+              <a:rPr lang="en-US" dirty="0"/>
               <a:t>Click to add title</a:t>
             </a:r>
-            <a:endParaRPr lang="en-US" dirty="0"/>
           </a:p>
         </p:txBody>
       </p:sp>
@@ -6260,21 +6074,21 @@
           <a:p>
             <a:pPr lvl="0"/>
             <a:r>
-              <a:rPr lang="en-US" dirty="0" smtClean="0"/>
+              <a:rPr lang="en-US" dirty="0"/>
               <a:t>Click to add first-level bullet</a:t>
             </a:r>
           </a:p>
           <a:p>
             <a:pPr lvl="1"/>
             <a:r>
-              <a:rPr lang="en-US" dirty="0" smtClean="0"/>
+              <a:rPr lang="en-US" dirty="0"/>
               <a:t>Second level</a:t>
             </a:r>
           </a:p>
           <a:p>
             <a:pPr lvl="2"/>
             <a:r>
-              <a:rPr lang="en-US" dirty="0" smtClean="0"/>
+              <a:rPr lang="en-US" dirty="0"/>
               <a:t>Third level</a:t>
             </a:r>
           </a:p>
@@ -6383,7 +6197,7 @@
           <a:p>
             <a:pPr lvl="0"/>
             <a:r>
-              <a:rPr lang="en-US" dirty="0" smtClean="0"/>
+              <a:rPr lang="en-US" dirty="0"/>
               <a:t>Click to add source information</a:t>
             </a:r>
           </a:p>
@@ -6399,13 +6213,6 @@
   <p:clrMapOvr>
     <a:masterClrMapping/>
   </p:clrMapOvr>
-  <p:timing>
-    <p:tnLst>
-      <p:par>
-        <p:cTn id="1" dur="indefinite" restart="never" nodeType="tmRoot"/>
-      </p:par>
-    </p:tnLst>
-  </p:timing>
   <p:extLst mod="1">
     <p:ext uri="{DCECCB84-F9BA-43D5-87BE-67443E8EF086}">
       <p15:sldGuideLst xmlns:p15="http://schemas.microsoft.com/office/powerpoint/2012/main">
@@ -6490,10 +6297,9 @@
           </a:lstStyle>
           <a:p>
             <a:r>
-              <a:rPr lang="en-US" dirty="0" smtClean="0"/>
+              <a:rPr lang="en-US" dirty="0"/>
               <a:t>Click to add title</a:t>
             </a:r>
-            <a:endParaRPr lang="en-US" dirty="0"/>
           </a:p>
         </p:txBody>
       </p:sp>
@@ -6577,21 +6383,21 @@
           <a:p>
             <a:pPr lvl="0"/>
             <a:r>
-              <a:rPr lang="en-US" dirty="0" smtClean="0"/>
+              <a:rPr lang="en-US" dirty="0"/>
               <a:t>Click to add first-level bullet</a:t>
             </a:r>
           </a:p>
           <a:p>
             <a:pPr lvl="1"/>
             <a:r>
-              <a:rPr lang="en-US" dirty="0" smtClean="0"/>
+              <a:rPr lang="en-US" dirty="0"/>
               <a:t>Second level</a:t>
             </a:r>
           </a:p>
           <a:p>
             <a:pPr lvl="2"/>
             <a:r>
-              <a:rPr lang="en-US" dirty="0" smtClean="0"/>
+              <a:rPr lang="en-US" dirty="0"/>
               <a:t>Third level</a:t>
             </a:r>
           </a:p>
@@ -6677,21 +6483,21 @@
           <a:p>
             <a:pPr lvl="0"/>
             <a:r>
-              <a:rPr lang="en-US" dirty="0" smtClean="0"/>
+              <a:rPr lang="en-US" dirty="0"/>
               <a:t>Click to add first-level bullet</a:t>
             </a:r>
           </a:p>
           <a:p>
             <a:pPr lvl="1"/>
             <a:r>
-              <a:rPr lang="en-US" dirty="0" smtClean="0"/>
+              <a:rPr lang="en-US" dirty="0"/>
               <a:t>Second level</a:t>
             </a:r>
           </a:p>
           <a:p>
             <a:pPr lvl="2"/>
             <a:r>
-              <a:rPr lang="en-US" dirty="0" smtClean="0"/>
+              <a:rPr lang="en-US" dirty="0"/>
               <a:t>Third level</a:t>
             </a:r>
           </a:p>
@@ -6800,7 +6606,7 @@
           <a:p>
             <a:pPr lvl="0"/>
             <a:r>
-              <a:rPr lang="en-US" dirty="0" smtClean="0"/>
+              <a:rPr lang="en-US" dirty="0"/>
               <a:t>Click to add source information</a:t>
             </a:r>
           </a:p>
@@ -6816,13 +6622,6 @@
   <p:clrMapOvr>
     <a:masterClrMapping/>
   </p:clrMapOvr>
-  <p:timing>
-    <p:tnLst>
-      <p:par>
-        <p:cTn id="1" dur="indefinite" restart="never" nodeType="tmRoot"/>
-      </p:par>
-    </p:tnLst>
-  </p:timing>
   <p:extLst mod="1">
     <p:ext uri="{DCECCB84-F9BA-43D5-87BE-67443E8EF086}">
       <p15:sldGuideLst xmlns:p15="http://schemas.microsoft.com/office/powerpoint/2012/main">
@@ -6902,10 +6701,9 @@
           </a:lstStyle>
           <a:p>
             <a:r>
-              <a:rPr lang="en-US" dirty="0" smtClean="0"/>
+              <a:rPr lang="en-US" dirty="0"/>
               <a:t>Click to add title</a:t>
             </a:r>
-            <a:endParaRPr lang="en-US" dirty="0"/>
           </a:p>
         </p:txBody>
       </p:sp>
@@ -6989,21 +6787,21 @@
           <a:p>
             <a:pPr lvl="0"/>
             <a:r>
-              <a:rPr lang="en-US" dirty="0" smtClean="0"/>
+              <a:rPr lang="en-US" dirty="0"/>
               <a:t>Click to add first-level bullet</a:t>
             </a:r>
           </a:p>
           <a:p>
             <a:pPr lvl="1"/>
             <a:r>
-              <a:rPr lang="en-US" dirty="0" smtClean="0"/>
+              <a:rPr lang="en-US" dirty="0"/>
               <a:t>Second level</a:t>
             </a:r>
           </a:p>
           <a:p>
             <a:pPr lvl="2"/>
             <a:r>
-              <a:rPr lang="en-US" dirty="0" smtClean="0"/>
+              <a:rPr lang="en-US" dirty="0"/>
               <a:t>Third level</a:t>
             </a:r>
           </a:p>
@@ -7089,21 +6887,21 @@
           <a:p>
             <a:pPr lvl="0"/>
             <a:r>
-              <a:rPr lang="en-US" dirty="0" smtClean="0"/>
+              <a:rPr lang="en-US" dirty="0"/>
               <a:t>Click to add first-level bullet</a:t>
             </a:r>
           </a:p>
           <a:p>
             <a:pPr lvl="1"/>
             <a:r>
-              <a:rPr lang="en-US" dirty="0" smtClean="0"/>
+              <a:rPr lang="en-US" dirty="0"/>
               <a:t>Second level</a:t>
             </a:r>
           </a:p>
           <a:p>
             <a:pPr lvl="2"/>
             <a:r>
-              <a:rPr lang="en-US" dirty="0" smtClean="0"/>
+              <a:rPr lang="en-US" dirty="0"/>
               <a:t>Third level</a:t>
             </a:r>
           </a:p>
@@ -7212,7 +7010,7 @@
           <a:p>
             <a:pPr lvl="0"/>
             <a:r>
-              <a:rPr lang="en-US" dirty="0" smtClean="0"/>
+              <a:rPr lang="en-US" dirty="0"/>
               <a:t>Click to add source information</a:t>
             </a:r>
           </a:p>
@@ -7224,13 +7022,6 @@
   <p:clrMapOvr>
     <a:masterClrMapping/>
   </p:clrMapOvr>
-  <p:timing>
-    <p:tnLst>
-      <p:par>
-        <p:cTn id="1" dur="indefinite" restart="never" nodeType="tmRoot"/>
-      </p:par>
-    </p:tnLst>
-  </p:timing>
   <p:extLst mod="1">
     <p:ext uri="{DCECCB84-F9BA-43D5-87BE-67443E8EF086}">
       <p15:sldGuideLst xmlns:p15="http://schemas.microsoft.com/office/powerpoint/2012/main">
@@ -7307,10 +7098,9 @@
           </a:lstStyle>
           <a:p>
             <a:r>
-              <a:rPr lang="en-US" dirty="0" smtClean="0"/>
+              <a:rPr lang="en-US" dirty="0"/>
               <a:t>Click to add title</a:t>
             </a:r>
-            <a:endParaRPr lang="en-US" dirty="0"/>
           </a:p>
         </p:txBody>
       </p:sp>
@@ -7351,7 +7141,7 @@
           <a:p>
             <a:pPr lvl="0"/>
             <a:r>
-              <a:rPr lang="en-US" dirty="0" smtClean="0"/>
+              <a:rPr lang="en-US" dirty="0"/>
               <a:t>Click to add table/graph title</a:t>
             </a:r>
           </a:p>
@@ -7437,21 +7227,21 @@
           <a:p>
             <a:pPr lvl="0"/>
             <a:r>
-              <a:rPr lang="en-US" dirty="0" smtClean="0"/>
+              <a:rPr lang="en-US" dirty="0"/>
               <a:t>Click to add first-level bullet</a:t>
             </a:r>
           </a:p>
           <a:p>
             <a:pPr lvl="1"/>
             <a:r>
-              <a:rPr lang="en-US" dirty="0" smtClean="0"/>
+              <a:rPr lang="en-US" dirty="0"/>
               <a:t>Second level</a:t>
             </a:r>
           </a:p>
           <a:p>
             <a:pPr lvl="2"/>
             <a:r>
-              <a:rPr lang="en-US" dirty="0" smtClean="0"/>
+              <a:rPr lang="en-US" dirty="0"/>
               <a:t>Third level</a:t>
             </a:r>
           </a:p>
@@ -7560,7 +7350,7 @@
           <a:p>
             <a:pPr lvl="0"/>
             <a:r>
-              <a:rPr lang="en-US" dirty="0" smtClean="0"/>
+              <a:rPr lang="en-US" dirty="0"/>
               <a:t>Click to add source information</a:t>
             </a:r>
           </a:p>
@@ -7576,13 +7366,6 @@
   <p:clrMapOvr>
     <a:masterClrMapping/>
   </p:clrMapOvr>
-  <p:timing>
-    <p:tnLst>
-      <p:par>
-        <p:cTn id="1" dur="indefinite" restart="never" nodeType="tmRoot"/>
-      </p:par>
-    </p:tnLst>
-  </p:timing>
   <p:extLst mod="1">
     <p:ext uri="{DCECCB84-F9BA-43D5-87BE-67443E8EF086}">
       <p15:sldGuideLst xmlns:p15="http://schemas.microsoft.com/office/powerpoint/2012/main">
@@ -7650,10 +7433,9 @@
           <a:lstStyle/>
           <a:p>
             <a:r>
-              <a:rPr lang="en-US" dirty="0" smtClean="0"/>
+              <a:rPr lang="en-US" dirty="0"/>
               <a:t>Click to add title</a:t>
             </a:r>
-            <a:endParaRPr lang="en-US" dirty="0"/>
           </a:p>
         </p:txBody>
       </p:sp>
@@ -7710,7 +7492,7 @@
           <a:p>
             <a:pPr lvl="0"/>
             <a:r>
-              <a:rPr lang="en-US" dirty="0" smtClean="0"/>
+              <a:rPr lang="en-US" dirty="0"/>
               <a:t>Click to add quote</a:t>
             </a:r>
           </a:p>
@@ -7819,7 +7601,7 @@
           <a:p>
             <a:pPr lvl="0"/>
             <a:r>
-              <a:rPr lang="en-US" dirty="0" smtClean="0"/>
+              <a:rPr lang="en-US" dirty="0"/>
               <a:t>Click to add source information</a:t>
             </a:r>
           </a:p>
@@ -7835,13 +7617,6 @@
   <p:clrMapOvr>
     <a:masterClrMapping/>
   </p:clrMapOvr>
-  <p:timing>
-    <p:tnLst>
-      <p:par>
-        <p:cTn id="1" dur="indefinite" restart="never" nodeType="tmRoot"/>
-      </p:par>
-    </p:tnLst>
-  </p:timing>
   <p:extLst mod="1">
     <p:ext uri="{DCECCB84-F9BA-43D5-87BE-67443E8EF086}">
       <p15:sldGuideLst xmlns:p15="http://schemas.microsoft.com/office/powerpoint/2012/main">
@@ -7917,10 +7692,9 @@
           <a:lstStyle/>
           <a:p>
             <a:r>
-              <a:rPr lang="en-US" dirty="0" smtClean="0"/>
+              <a:rPr lang="en-US" dirty="0"/>
               <a:t>Click to add title</a:t>
             </a:r>
-            <a:endParaRPr lang="en-US" dirty="0"/>
           </a:p>
         </p:txBody>
       </p:sp>
@@ -8004,21 +7778,21 @@
           <a:p>
             <a:pPr lvl="0"/>
             <a:r>
-              <a:rPr lang="en-US" dirty="0" smtClean="0"/>
+              <a:rPr lang="en-US" dirty="0"/>
               <a:t>Click to add first-level bullet</a:t>
             </a:r>
           </a:p>
           <a:p>
             <a:pPr lvl="1"/>
             <a:r>
-              <a:rPr lang="en-US" dirty="0" smtClean="0"/>
+              <a:rPr lang="en-US" dirty="0"/>
               <a:t>Second level</a:t>
             </a:r>
           </a:p>
           <a:p>
             <a:pPr lvl="2"/>
             <a:r>
-              <a:rPr lang="en-US" dirty="0" smtClean="0"/>
+              <a:rPr lang="en-US" dirty="0"/>
               <a:t>Third level</a:t>
             </a:r>
           </a:p>
@@ -8104,21 +7878,21 @@
           <a:p>
             <a:pPr lvl="0"/>
             <a:r>
-              <a:rPr lang="en-US" dirty="0" smtClean="0"/>
+              <a:rPr lang="en-US" dirty="0"/>
               <a:t>Click to add first-level bullet</a:t>
             </a:r>
           </a:p>
           <a:p>
             <a:pPr lvl="1"/>
             <a:r>
-              <a:rPr lang="en-US" dirty="0" smtClean="0"/>
+              <a:rPr lang="en-US" dirty="0"/>
               <a:t>Second level</a:t>
             </a:r>
           </a:p>
           <a:p>
             <a:pPr lvl="2"/>
             <a:r>
-              <a:rPr lang="en-US" dirty="0" smtClean="0"/>
+              <a:rPr lang="en-US" dirty="0"/>
               <a:t>Third level</a:t>
             </a:r>
           </a:p>
@@ -8204,21 +7978,21 @@
           <a:p>
             <a:pPr lvl="0"/>
             <a:r>
-              <a:rPr lang="en-US" dirty="0" smtClean="0"/>
+              <a:rPr lang="en-US" dirty="0"/>
               <a:t>Click to add first-level bullet</a:t>
             </a:r>
           </a:p>
           <a:p>
             <a:pPr lvl="1"/>
             <a:r>
-              <a:rPr lang="en-US" dirty="0" smtClean="0"/>
+              <a:rPr lang="en-US" dirty="0"/>
               <a:t>Second level</a:t>
             </a:r>
           </a:p>
           <a:p>
             <a:pPr lvl="2"/>
             <a:r>
-              <a:rPr lang="en-US" dirty="0" smtClean="0"/>
+              <a:rPr lang="en-US" dirty="0"/>
               <a:t>Third level</a:t>
             </a:r>
           </a:p>
@@ -8304,21 +8078,21 @@
           <a:p>
             <a:pPr lvl="0"/>
             <a:r>
-              <a:rPr lang="en-US" dirty="0" smtClean="0"/>
+              <a:rPr lang="en-US" dirty="0"/>
               <a:t>Click to add first-level bullet</a:t>
             </a:r>
           </a:p>
           <a:p>
             <a:pPr lvl="1"/>
             <a:r>
-              <a:rPr lang="en-US" dirty="0" smtClean="0"/>
+              <a:rPr lang="en-US" dirty="0"/>
               <a:t>Second level</a:t>
             </a:r>
           </a:p>
           <a:p>
             <a:pPr lvl="2"/>
             <a:r>
-              <a:rPr lang="en-US" dirty="0" smtClean="0"/>
+              <a:rPr lang="en-US" dirty="0"/>
               <a:t>Third level</a:t>
             </a:r>
           </a:p>
@@ -8427,7 +8201,7 @@
           <a:p>
             <a:pPr lvl="0"/>
             <a:r>
-              <a:rPr lang="en-US" dirty="0" smtClean="0"/>
+              <a:rPr lang="en-US" dirty="0"/>
               <a:t>Click to add source information</a:t>
             </a:r>
           </a:p>
@@ -8439,13 +8213,6 @@
   <p:clrMapOvr>
     <a:masterClrMapping/>
   </p:clrMapOvr>
-  <p:timing>
-    <p:tnLst>
-      <p:par>
-        <p:cTn id="1" dur="indefinite" restart="never" nodeType="tmRoot"/>
-      </p:par>
-    </p:tnLst>
-  </p:timing>
   <p:extLst mod="1">
     <p:ext uri="{DCECCB84-F9BA-43D5-87BE-67443E8EF086}">
       <p15:sldGuideLst xmlns:p15="http://schemas.microsoft.com/office/powerpoint/2012/main">
@@ -8533,10 +8300,9 @@
           <a:lstStyle/>
           <a:p>
             <a:r>
-              <a:rPr lang="en-US" dirty="0" smtClean="0"/>
+              <a:rPr lang="en-US" dirty="0"/>
               <a:t>Click to add title</a:t>
             </a:r>
-            <a:endParaRPr lang="en-US" dirty="0"/>
           </a:p>
         </p:txBody>
       </p:sp>
@@ -8593,7 +8359,7 @@
           <a:p>
             <a:pPr lvl="0"/>
             <a:r>
-              <a:rPr lang="en-US" dirty="0" smtClean="0"/>
+              <a:rPr lang="en-US" dirty="0"/>
               <a:t>Click to add quote</a:t>
             </a:r>
           </a:p>
@@ -8631,10 +8397,9 @@
           </a:lstStyle>
           <a:p>
             <a:r>
-              <a:rPr lang="en-US" dirty="0" smtClean="0"/>
+              <a:rPr lang="en-US" dirty="0"/>
               <a:t>Click to add source information</a:t>
             </a:r>
-            <a:endParaRPr lang="en-US" dirty="0"/>
           </a:p>
         </p:txBody>
       </p:sp>
@@ -8648,13 +8413,6 @@
   <p:clrMapOvr>
     <a:masterClrMapping/>
   </p:clrMapOvr>
-  <p:timing>
-    <p:tnLst>
-      <p:par>
-        <p:cTn id="1" dur="indefinite" restart="never" nodeType="tmRoot"/>
-      </p:par>
-    </p:tnLst>
-  </p:timing>
   <p:extLst mod="1">
     <p:ext uri="{DCECCB84-F9BA-43D5-87BE-67443E8EF086}">
       <p15:sldGuideLst xmlns:p15="http://schemas.microsoft.com/office/powerpoint/2012/main">
@@ -8727,10 +8485,9 @@
           <a:lstStyle/>
           <a:p>
             <a:r>
-              <a:rPr lang="en-US" dirty="0" smtClean="0"/>
+              <a:rPr lang="en-US" dirty="0"/>
               <a:t>Click to add title</a:t>
             </a:r>
-            <a:endParaRPr lang="en-US" dirty="0"/>
           </a:p>
         </p:txBody>
       </p:sp>
@@ -8814,21 +8571,21 @@
           <a:p>
             <a:pPr lvl="0"/>
             <a:r>
-              <a:rPr lang="en-US" dirty="0" smtClean="0"/>
+              <a:rPr lang="en-US" dirty="0"/>
               <a:t>Click to add first-level bullet</a:t>
             </a:r>
           </a:p>
           <a:p>
             <a:pPr lvl="1"/>
             <a:r>
-              <a:rPr lang="en-US" dirty="0" smtClean="0"/>
+              <a:rPr lang="en-US" dirty="0"/>
               <a:t>Second level</a:t>
             </a:r>
           </a:p>
           <a:p>
             <a:pPr lvl="2"/>
             <a:r>
-              <a:rPr lang="en-US" dirty="0" smtClean="0"/>
+              <a:rPr lang="en-US" dirty="0"/>
               <a:t>Third level</a:t>
             </a:r>
           </a:p>
@@ -8866,10 +8623,9 @@
           </a:lstStyle>
           <a:p>
             <a:r>
-              <a:rPr lang="en-US" dirty="0" smtClean="0"/>
+              <a:rPr lang="en-US" dirty="0"/>
               <a:t>Click to add source information</a:t>
             </a:r>
-            <a:endParaRPr lang="en-US" dirty="0"/>
           </a:p>
         </p:txBody>
       </p:sp>
@@ -8978,10 +8734,9 @@
           </a:lstStyle>
           <a:p>
             <a:r>
-              <a:rPr lang="en-US" dirty="0" smtClean="0"/>
+              <a:rPr lang="en-US" dirty="0"/>
               <a:t>Click to add section title</a:t>
             </a:r>
-            <a:endParaRPr lang="en-US" dirty="0"/>
           </a:p>
         </p:txBody>
       </p:sp>
@@ -9008,7 +8763,7 @@
           <a:p>
             <a:pPr algn="ctr"/>
             <a:r>
-              <a:rPr lang="en-US" sz="1200" kern="1200" dirty="0" smtClean="0">
+              <a:rPr lang="en-US" sz="1200" kern="1200" dirty="0">
                 <a:solidFill>
                   <a:schemeClr val="bg1"/>
                 </a:solidFill>
@@ -9019,7 +8774,7 @@
               <a:t>The material in this video is subject to the copyright of the owners of the material and is being provided for educational purposes</a:t>
             </a:r>
             <a:r>
-              <a:rPr lang="en-US" sz="1200" kern="1200" baseline="0" dirty="0" smtClean="0">
+              <a:rPr lang="en-US" sz="1200" kern="1200" baseline="0" dirty="0">
                 <a:solidFill>
                   <a:schemeClr val="bg1"/>
                 </a:solidFill>
@@ -9030,7 +8785,7 @@
               <a:t> </a:t>
             </a:r>
             <a:r>
-              <a:rPr lang="en-US" sz="1200" kern="1200" dirty="0" smtClean="0">
+              <a:rPr lang="en-US" sz="1200" kern="1200" dirty="0">
                 <a:solidFill>
                   <a:schemeClr val="bg1"/>
                 </a:solidFill>
@@ -9041,7 +8796,7 @@
               <a:t>under</a:t>
             </a:r>
             <a:br>
-              <a:rPr lang="en-US" sz="1200" kern="1200" dirty="0" smtClean="0">
+              <a:rPr lang="en-US" sz="1200" kern="1200" dirty="0">
                 <a:solidFill>
                   <a:schemeClr val="bg1"/>
                 </a:solidFill>
@@ -9051,7 +8806,7 @@
               </a:rPr>
             </a:br>
             <a:r>
-              <a:rPr lang="en-US" sz="1200" kern="1200" dirty="0" smtClean="0">
+              <a:rPr lang="en-US" sz="1200" kern="1200" dirty="0">
                 <a:solidFill>
                   <a:schemeClr val="bg1"/>
                 </a:solidFill>
@@ -9162,13 +8917,6 @@
   <p:clrMapOvr>
     <a:masterClrMapping/>
   </p:clrMapOvr>
-  <p:timing>
-    <p:tnLst>
-      <p:par>
-        <p:cTn id="1" dur="indefinite" restart="never" nodeType="tmRoot"/>
-      </p:par>
-    </p:tnLst>
-  </p:timing>
 </p:sldLayout>
 </file>
 
@@ -9224,10 +8972,9 @@
           </a:lstStyle>
           <a:p>
             <a:r>
-              <a:rPr lang="en-US" dirty="0" smtClean="0"/>
+              <a:rPr lang="en-US" dirty="0"/>
               <a:t>Click to edit Master title style</a:t>
             </a:r>
-            <a:endParaRPr lang="en-US" dirty="0"/>
           </a:p>
         </p:txBody>
       </p:sp>
@@ -9263,10 +9010,9 @@
           </a:lstStyle>
           <a:p>
             <a:r>
-              <a:rPr lang="en-US" dirty="0" smtClean="0"/>
+              <a:rPr lang="en-US" dirty="0"/>
               <a:t>Click to add source information</a:t>
             </a:r>
-            <a:endParaRPr lang="en-US" dirty="0"/>
           </a:p>
         </p:txBody>
       </p:sp>
@@ -9370,7 +9116,7 @@
           <a:p>
             <a:pPr algn="ctr"/>
             <a:r>
-              <a:rPr lang="en-US" sz="3200" dirty="0" smtClean="0">
+              <a:rPr lang="en-US" sz="3200" dirty="0">
                 <a:solidFill>
                   <a:schemeClr val="bg1"/>
                 </a:solidFill>
@@ -9378,14 +9124,14 @@
               <a:t>THIS SLIDE IS FOR NOTICE ONLY</a:t>
             </a:r>
             <a:br>
-              <a:rPr lang="en-US" sz="3200" dirty="0" smtClean="0">
+              <a:rPr lang="en-US" sz="3200" dirty="0">
                 <a:solidFill>
                   <a:schemeClr val="bg1"/>
                 </a:solidFill>
               </a:rPr>
             </a:br>
             <a:r>
-              <a:rPr lang="en-US" sz="2000" dirty="0" smtClean="0">
+              <a:rPr lang="en-US" sz="2000" dirty="0">
                 <a:solidFill>
                   <a:schemeClr val="bg1"/>
                 </a:solidFill>
@@ -9393,29 +9139,21 @@
               <a:t>and is not intended to be used in a presentation</a:t>
             </a:r>
             <a:br>
-              <a:rPr lang="en-US" sz="2000" dirty="0" smtClean="0">
+              <a:rPr lang="en-US" sz="2000" dirty="0">
                 <a:solidFill>
                   <a:schemeClr val="bg1"/>
                 </a:solidFill>
               </a:rPr>
             </a:br>
-            <a:r>
-              <a:rPr lang="en-US" dirty="0" smtClean="0">
-                <a:solidFill>
-                  <a:schemeClr val="bg1"/>
-                </a:solidFill>
-              </a:rPr>
-              <a:t/>
-            </a:r>
             <a:br>
-              <a:rPr lang="en-US" dirty="0" smtClean="0">
+              <a:rPr lang="en-US" dirty="0">
                 <a:solidFill>
                   <a:schemeClr val="bg1"/>
                 </a:solidFill>
               </a:rPr>
             </a:br>
             <a:r>
-              <a:rPr lang="en-US" dirty="0" smtClean="0">
+              <a:rPr lang="en-US" dirty="0">
                 <a:solidFill>
                   <a:schemeClr val="bg1"/>
                 </a:solidFill>
@@ -9423,7 +9161,7 @@
               <a:t>This</a:t>
             </a:r>
             <a:r>
-              <a:rPr lang="en-US" baseline="0" dirty="0" smtClean="0">
+              <a:rPr lang="en-US" baseline="0" dirty="0">
                 <a:solidFill>
                   <a:schemeClr val="bg1"/>
                 </a:solidFill>
@@ -9431,14 +9169,14 @@
               <a:t> PowerPoint Template was developed by:</a:t>
             </a:r>
             <a:br>
-              <a:rPr lang="en-US" baseline="0" dirty="0" smtClean="0">
+              <a:rPr lang="en-US" baseline="0" dirty="0">
                 <a:solidFill>
                   <a:schemeClr val="bg1"/>
                 </a:solidFill>
               </a:rPr>
             </a:br>
             <a:r>
-              <a:rPr lang="en-US" i="1" baseline="0" dirty="0" smtClean="0">
+              <a:rPr lang="en-US" i="1" baseline="0" dirty="0">
                 <a:solidFill>
                   <a:schemeClr val="bg1"/>
                 </a:solidFill>
@@ -9446,14 +9184,14 @@
               <a:t>The Center for Teaching and Learning (CTL)</a:t>
             </a:r>
             <a:br>
-              <a:rPr lang="en-US" i="1" baseline="0" dirty="0" smtClean="0">
+              <a:rPr lang="en-US" i="1" baseline="0" dirty="0">
                 <a:solidFill>
                   <a:schemeClr val="bg1"/>
                 </a:solidFill>
               </a:rPr>
             </a:br>
             <a:r>
-              <a:rPr lang="en-US" i="1" baseline="0" dirty="0" smtClean="0">
+              <a:rPr lang="en-US" i="1" baseline="0" dirty="0">
                 <a:solidFill>
                   <a:schemeClr val="bg1"/>
                 </a:solidFill>
@@ -9461,29 +9199,21 @@
               <a:t>Johns Hopkins Bloomberg School of Public Health</a:t>
             </a:r>
             <a:br>
-              <a:rPr lang="en-US" i="1" baseline="0" dirty="0" smtClean="0">
+              <a:rPr lang="en-US" i="1" baseline="0" dirty="0">
                 <a:solidFill>
                   <a:schemeClr val="bg1"/>
                 </a:solidFill>
               </a:rPr>
             </a:br>
-            <a:r>
-              <a:rPr lang="en-US" i="1" baseline="0" dirty="0" smtClean="0">
-                <a:solidFill>
-                  <a:schemeClr val="bg1"/>
-                </a:solidFill>
-              </a:rPr>
-              <a:t/>
-            </a:r>
             <a:br>
-              <a:rPr lang="en-US" i="1" baseline="0" dirty="0" smtClean="0">
+              <a:rPr lang="en-US" i="1" baseline="0" dirty="0">
                 <a:solidFill>
                   <a:schemeClr val="bg1"/>
                 </a:solidFill>
               </a:rPr>
             </a:br>
             <a:r>
-              <a:rPr lang="en-US" dirty="0" smtClean="0">
+              <a:rPr lang="en-US" dirty="0">
                 <a:solidFill>
                   <a:schemeClr val="bg1"/>
                 </a:solidFill>
@@ -9491,14 +9221,14 @@
               <a:t>Last</a:t>
             </a:r>
             <a:r>
-              <a:rPr lang="en-US" baseline="0" dirty="0" smtClean="0">
+              <a:rPr lang="en-US" baseline="0" dirty="0">
                 <a:solidFill>
                   <a:schemeClr val="bg1"/>
                 </a:solidFill>
               </a:rPr>
               <a:t> modified: 21 September 2017</a:t>
             </a:r>
-            <a:endParaRPr lang="en-US" dirty="0" smtClean="0">
+            <a:endParaRPr lang="en-US" dirty="0">
               <a:solidFill>
                 <a:schemeClr val="bg1"/>
               </a:solidFill>
@@ -9538,10 +9268,9 @@
           </a:lstStyle>
           <a:p>
             <a:r>
-              <a:rPr lang="en-US" dirty="0" smtClean="0"/>
+              <a:rPr lang="en-US" dirty="0"/>
               <a:t>Click to add source information</a:t>
             </a:r>
-            <a:endParaRPr lang="en-US" dirty="0"/>
           </a:p>
         </p:txBody>
       </p:sp>
@@ -9630,10 +9359,9 @@
           <a:lstStyle/>
           <a:p>
             <a:r>
-              <a:rPr lang="en-US" dirty="0" smtClean="0"/>
+              <a:rPr lang="en-US" dirty="0"/>
               <a:t>Click to add slide title</a:t>
             </a:r>
-            <a:endParaRPr lang="en-US" dirty="0"/>
           </a:p>
         </p:txBody>
       </p:sp>
@@ -9683,21 +9411,21 @@
           <a:p>
             <a:pPr lvl="0"/>
             <a:r>
-              <a:rPr lang="en-US" dirty="0" smtClean="0"/>
+              <a:rPr lang="en-US" dirty="0"/>
               <a:t>Click to add first-level bullet</a:t>
             </a:r>
           </a:p>
           <a:p>
             <a:pPr lvl="1"/>
             <a:r>
-              <a:rPr lang="en-US" dirty="0" smtClean="0"/>
+              <a:rPr lang="en-US" dirty="0"/>
               <a:t>Second level</a:t>
             </a:r>
           </a:p>
           <a:p>
             <a:pPr lvl="2"/>
             <a:r>
-              <a:rPr lang="en-US" dirty="0" smtClean="0"/>
+              <a:rPr lang="en-US" dirty="0"/>
               <a:t>Third level</a:t>
             </a:r>
           </a:p>
@@ -9803,7 +9531,7 @@
           <a:p>
             <a:pPr lvl="0"/>
             <a:r>
-              <a:rPr lang="en-US" dirty="0" smtClean="0"/>
+              <a:rPr lang="en-US" dirty="0"/>
               <a:t>Click to add source information</a:t>
             </a:r>
           </a:p>
@@ -9819,13 +9547,6 @@
   <p:clrMapOvr>
     <a:masterClrMapping/>
   </p:clrMapOvr>
-  <p:timing>
-    <p:tnLst>
-      <p:par>
-        <p:cTn id="1" dur="indefinite" restart="never" nodeType="tmRoot"/>
-      </p:par>
-    </p:tnLst>
-  </p:timing>
 </p:sldLayout>
 </file>
 
@@ -9862,10 +9583,9 @@
           <a:lstStyle/>
           <a:p>
             <a:r>
-              <a:rPr lang="en-US" dirty="0" smtClean="0"/>
+              <a:rPr lang="en-US" dirty="0"/>
               <a:t>Click to add slide title</a:t>
             </a:r>
-            <a:endParaRPr lang="en-US" dirty="0"/>
           </a:p>
         </p:txBody>
       </p:sp>
@@ -9919,21 +9639,21 @@
           <a:p>
             <a:pPr lvl="0"/>
             <a:r>
-              <a:rPr lang="en-US" dirty="0" smtClean="0"/>
+              <a:rPr lang="en-US" dirty="0"/>
               <a:t>Click to add first-level bullet</a:t>
             </a:r>
           </a:p>
           <a:p>
             <a:pPr lvl="1"/>
             <a:r>
-              <a:rPr lang="en-US" dirty="0" smtClean="0"/>
+              <a:rPr lang="en-US" dirty="0"/>
               <a:t>Second level</a:t>
             </a:r>
           </a:p>
           <a:p>
             <a:pPr lvl="2"/>
             <a:r>
-              <a:rPr lang="en-US" dirty="0" smtClean="0"/>
+              <a:rPr lang="en-US" dirty="0"/>
               <a:t>Third level</a:t>
             </a:r>
           </a:p>
@@ -9989,21 +9709,21 @@
           <a:p>
             <a:pPr lvl="0"/>
             <a:r>
-              <a:rPr lang="en-US" dirty="0" smtClean="0"/>
+              <a:rPr lang="en-US" dirty="0"/>
               <a:t>Click to add first-level bullet</a:t>
             </a:r>
           </a:p>
           <a:p>
             <a:pPr lvl="1"/>
             <a:r>
-              <a:rPr lang="en-US" dirty="0" smtClean="0"/>
+              <a:rPr lang="en-US" dirty="0"/>
               <a:t>Second level</a:t>
             </a:r>
           </a:p>
           <a:p>
             <a:pPr lvl="2"/>
             <a:r>
-              <a:rPr lang="en-US" dirty="0" smtClean="0"/>
+              <a:rPr lang="en-US" dirty="0"/>
               <a:t>Third level</a:t>
             </a:r>
           </a:p>
@@ -10109,7 +9829,7 @@
           <a:p>
             <a:pPr lvl="0"/>
             <a:r>
-              <a:rPr lang="en-US" dirty="0" smtClean="0"/>
+              <a:rPr lang="en-US" dirty="0"/>
               <a:t>Click to add source information</a:t>
             </a:r>
           </a:p>
@@ -10125,13 +9845,6 @@
   <p:clrMapOvr>
     <a:masterClrMapping/>
   </p:clrMapOvr>
-  <p:timing>
-    <p:tnLst>
-      <p:par>
-        <p:cTn id="1" dur="indefinite" restart="never" nodeType="tmRoot"/>
-      </p:par>
-    </p:tnLst>
-  </p:timing>
 </p:sldLayout>
 </file>
 
@@ -10168,10 +9881,9 @@
           <a:lstStyle/>
           <a:p>
             <a:r>
-              <a:rPr lang="en-US" dirty="0" smtClean="0"/>
+              <a:rPr lang="en-US" dirty="0"/>
               <a:t>Click to add slide title</a:t>
             </a:r>
-            <a:endParaRPr lang="en-US" dirty="0"/>
           </a:p>
         </p:txBody>
       </p:sp>
@@ -10222,21 +9934,21 @@
           <a:p>
             <a:pPr lvl="0"/>
             <a:r>
-              <a:rPr lang="en-US" dirty="0" smtClean="0"/>
+              <a:rPr lang="en-US" dirty="0"/>
               <a:t>Click to add first-level bullet</a:t>
             </a:r>
           </a:p>
           <a:p>
             <a:pPr lvl="1"/>
             <a:r>
-              <a:rPr lang="en-US" dirty="0" smtClean="0"/>
+              <a:rPr lang="en-US" dirty="0"/>
               <a:t>Second level</a:t>
             </a:r>
           </a:p>
           <a:p>
             <a:pPr lvl="2"/>
             <a:r>
-              <a:rPr lang="en-US" dirty="0" smtClean="0"/>
+              <a:rPr lang="en-US" dirty="0"/>
               <a:t>Third level</a:t>
             </a:r>
           </a:p>
@@ -10289,21 +10001,21 @@
           <a:p>
             <a:pPr lvl="0"/>
             <a:r>
-              <a:rPr lang="en-US" dirty="0" smtClean="0"/>
+              <a:rPr lang="en-US" dirty="0"/>
               <a:t>Click to add first-level bullet</a:t>
             </a:r>
           </a:p>
           <a:p>
             <a:pPr lvl="1"/>
             <a:r>
-              <a:rPr lang="en-US" dirty="0" smtClean="0"/>
+              <a:rPr lang="en-US" dirty="0"/>
               <a:t>Second level</a:t>
             </a:r>
           </a:p>
           <a:p>
             <a:pPr lvl="2"/>
             <a:r>
-              <a:rPr lang="en-US" dirty="0" smtClean="0"/>
+              <a:rPr lang="en-US" dirty="0"/>
               <a:t>Third level</a:t>
             </a:r>
           </a:p>
@@ -10356,21 +10068,21 @@
           <a:p>
             <a:pPr lvl="0"/>
             <a:r>
-              <a:rPr lang="en-US" dirty="0" smtClean="0"/>
+              <a:rPr lang="en-US" dirty="0"/>
               <a:t>Click to add first-level bullet</a:t>
             </a:r>
           </a:p>
           <a:p>
             <a:pPr lvl="1"/>
             <a:r>
-              <a:rPr lang="en-US" dirty="0" smtClean="0"/>
+              <a:rPr lang="en-US" dirty="0"/>
               <a:t>Second level</a:t>
             </a:r>
           </a:p>
           <a:p>
             <a:pPr lvl="2"/>
             <a:r>
-              <a:rPr lang="en-US" dirty="0" smtClean="0"/>
+              <a:rPr lang="en-US" dirty="0"/>
               <a:t>Third level</a:t>
             </a:r>
           </a:p>
@@ -10476,7 +10188,7 @@
           <a:p>
             <a:pPr lvl="0"/>
             <a:r>
-              <a:rPr lang="en-US" dirty="0" smtClean="0"/>
+              <a:rPr lang="en-US" dirty="0"/>
               <a:t>Click to add source information</a:t>
             </a:r>
           </a:p>
@@ -10488,13 +10200,6 @@
   <p:clrMapOvr>
     <a:masterClrMapping/>
   </p:clrMapOvr>
-  <p:timing>
-    <p:tnLst>
-      <p:par>
-        <p:cTn id="1" dur="indefinite" restart="never" nodeType="tmRoot"/>
-      </p:par>
-    </p:tnLst>
-  </p:timing>
 </p:sldLayout>
 </file>
 
@@ -10531,10 +10236,9 @@
           <a:lstStyle/>
           <a:p>
             <a:r>
-              <a:rPr lang="en-US" dirty="0" smtClean="0"/>
+              <a:rPr lang="en-US" dirty="0"/>
               <a:t>Click to add slide title</a:t>
             </a:r>
-            <a:endParaRPr lang="en-US" dirty="0"/>
           </a:p>
         </p:txBody>
       </p:sp>
@@ -10585,21 +10289,21 @@
           <a:p>
             <a:pPr lvl="0"/>
             <a:r>
-              <a:rPr lang="en-US" dirty="0" smtClean="0"/>
+              <a:rPr lang="en-US" dirty="0"/>
               <a:t>Click to add first-level bullet</a:t>
             </a:r>
           </a:p>
           <a:p>
             <a:pPr lvl="1"/>
             <a:r>
-              <a:rPr lang="en-US" dirty="0" smtClean="0"/>
+              <a:rPr lang="en-US" dirty="0"/>
               <a:t>Second level</a:t>
             </a:r>
           </a:p>
           <a:p>
             <a:pPr lvl="2"/>
             <a:r>
-              <a:rPr lang="en-US" dirty="0" smtClean="0"/>
+              <a:rPr lang="en-US" dirty="0"/>
               <a:t>Third level</a:t>
             </a:r>
           </a:p>
@@ -10652,21 +10356,21 @@
           <a:p>
             <a:pPr lvl="0"/>
             <a:r>
-              <a:rPr lang="en-US" dirty="0" smtClean="0"/>
+              <a:rPr lang="en-US" dirty="0"/>
               <a:t>Click to add first-level bullet</a:t>
             </a:r>
           </a:p>
           <a:p>
             <a:pPr lvl="1"/>
             <a:r>
-              <a:rPr lang="en-US" dirty="0" smtClean="0"/>
+              <a:rPr lang="en-US" dirty="0"/>
               <a:t>Second level</a:t>
             </a:r>
           </a:p>
           <a:p>
             <a:pPr lvl="2"/>
             <a:r>
-              <a:rPr lang="en-US" dirty="0" smtClean="0"/>
+              <a:rPr lang="en-US" dirty="0"/>
               <a:t>Third level</a:t>
             </a:r>
           </a:p>
@@ -10719,21 +10423,21 @@
           <a:p>
             <a:pPr lvl="0"/>
             <a:r>
-              <a:rPr lang="en-US" dirty="0" smtClean="0"/>
+              <a:rPr lang="en-US" dirty="0"/>
               <a:t>Click to add first-level bullet</a:t>
             </a:r>
           </a:p>
           <a:p>
             <a:pPr lvl="1"/>
             <a:r>
-              <a:rPr lang="en-US" dirty="0" smtClean="0"/>
+              <a:rPr lang="en-US" dirty="0"/>
               <a:t>Second level</a:t>
             </a:r>
           </a:p>
           <a:p>
             <a:pPr lvl="2"/>
             <a:r>
-              <a:rPr lang="en-US" dirty="0" smtClean="0"/>
+              <a:rPr lang="en-US" dirty="0"/>
               <a:t>Third level</a:t>
             </a:r>
           </a:p>
@@ -10839,7 +10543,7 @@
           <a:p>
             <a:pPr lvl="0"/>
             <a:r>
-              <a:rPr lang="en-US" dirty="0" smtClean="0"/>
+              <a:rPr lang="en-US" dirty="0"/>
               <a:t>Click to add source information</a:t>
             </a:r>
           </a:p>
@@ -10851,13 +10555,6 @@
   <p:clrMapOvr>
     <a:masterClrMapping/>
   </p:clrMapOvr>
-  <p:timing>
-    <p:tnLst>
-      <p:par>
-        <p:cTn id="1" dur="indefinite" restart="never" nodeType="tmRoot"/>
-      </p:par>
-    </p:tnLst>
-  </p:timing>
 </p:sldLayout>
 </file>
 
@@ -10916,10 +10613,9 @@
           </a:lstStyle>
           <a:p>
             <a:r>
-              <a:rPr lang="en-US" dirty="0" smtClean="0"/>
+              <a:rPr lang="en-US" dirty="0"/>
               <a:t>Click to add slide title</a:t>
             </a:r>
-            <a:endParaRPr lang="en-US" dirty="0"/>
           </a:p>
         </p:txBody>
       </p:sp>
@@ -10973,21 +10669,21 @@
           <a:p>
             <a:pPr lvl="0"/>
             <a:r>
-              <a:rPr lang="en-US" dirty="0" smtClean="0"/>
+              <a:rPr lang="en-US" dirty="0"/>
               <a:t>Click to add first-level bullet</a:t>
             </a:r>
           </a:p>
           <a:p>
             <a:pPr lvl="1"/>
             <a:r>
-              <a:rPr lang="en-US" dirty="0" smtClean="0"/>
+              <a:rPr lang="en-US" dirty="0"/>
               <a:t>Second level</a:t>
             </a:r>
           </a:p>
           <a:p>
             <a:pPr lvl="2"/>
             <a:r>
-              <a:rPr lang="en-US" dirty="0" smtClean="0"/>
+              <a:rPr lang="en-US" dirty="0"/>
               <a:t>Third level</a:t>
             </a:r>
           </a:p>
@@ -11046,21 +10742,21 @@
           <a:p>
             <a:pPr lvl="0"/>
             <a:r>
-              <a:rPr lang="en-US" dirty="0" smtClean="0"/>
+              <a:rPr lang="en-US" dirty="0"/>
               <a:t>Click to add first-level bullet</a:t>
             </a:r>
           </a:p>
           <a:p>
             <a:pPr lvl="1"/>
             <a:r>
-              <a:rPr lang="en-US" dirty="0" smtClean="0"/>
+              <a:rPr lang="en-US" dirty="0"/>
               <a:t>Second level</a:t>
             </a:r>
           </a:p>
           <a:p>
             <a:pPr lvl="2"/>
             <a:r>
-              <a:rPr lang="en-US" dirty="0" smtClean="0"/>
+              <a:rPr lang="en-US" dirty="0"/>
               <a:t>Third level</a:t>
             </a:r>
           </a:p>
@@ -11166,7 +10862,7 @@
           <a:p>
             <a:pPr lvl="0"/>
             <a:r>
-              <a:rPr lang="en-US" dirty="0" smtClean="0"/>
+              <a:rPr lang="en-US" dirty="0"/>
               <a:t>Click to add source information</a:t>
             </a:r>
           </a:p>
@@ -11182,21 +10878,6 @@
   <p:clrMapOvr>
     <a:masterClrMapping/>
   </p:clrMapOvr>
-  <mc:AlternateContent xmlns:mc="http://schemas.openxmlformats.org/markup-compatibility/2006" xmlns:p14="http://schemas.microsoft.com/office/powerpoint/2010/main">
-    <mc:Choice Requires="p14">
-      <p:transition spd="slow" p14:dur="2000"/>
-    </mc:Choice>
-    <mc:Fallback xmlns="">
-      <p:transition spd="slow"/>
-    </mc:Fallback>
-  </mc:AlternateContent>
-  <p:timing>
-    <p:tnLst>
-      <p:par>
-        <p:cTn id="1" dur="indefinite" restart="never" nodeType="tmRoot"/>
-      </p:par>
-    </p:tnLst>
-  </p:timing>
 </p:sldLayout>
 </file>
 
@@ -11255,10 +10936,9 @@
           </a:lstStyle>
           <a:p>
             <a:r>
-              <a:rPr lang="en-US" dirty="0" smtClean="0"/>
+              <a:rPr lang="en-US" dirty="0"/>
               <a:t>Click to add slide title</a:t>
             </a:r>
-            <a:endParaRPr lang="en-US" dirty="0"/>
           </a:p>
         </p:txBody>
       </p:sp>
@@ -11312,21 +10992,21 @@
           <a:p>
             <a:pPr lvl="0"/>
             <a:r>
-              <a:rPr lang="en-US" dirty="0" smtClean="0"/>
+              <a:rPr lang="en-US" dirty="0"/>
               <a:t>Click to add first-level bullet</a:t>
             </a:r>
           </a:p>
           <a:p>
             <a:pPr lvl="1"/>
             <a:r>
-              <a:rPr lang="en-US" dirty="0" smtClean="0"/>
+              <a:rPr lang="en-US" dirty="0"/>
               <a:t>Second level</a:t>
             </a:r>
           </a:p>
           <a:p>
             <a:pPr lvl="2"/>
             <a:r>
-              <a:rPr lang="en-US" dirty="0" smtClean="0"/>
+              <a:rPr lang="en-US" dirty="0"/>
               <a:t>Third level</a:t>
             </a:r>
           </a:p>
@@ -11384,7 +11064,7 @@
           <a:p>
             <a:pPr lvl="0"/>
             <a:r>
-              <a:rPr lang="en-US" dirty="0" smtClean="0"/>
+              <a:rPr lang="en-US" dirty="0"/>
               <a:t>Click to add caption</a:t>
             </a:r>
           </a:p>
@@ -11443,21 +11123,21 @@
           <a:p>
             <a:pPr lvl="0"/>
             <a:r>
-              <a:rPr lang="en-US" dirty="0" smtClean="0"/>
+              <a:rPr lang="en-US" dirty="0"/>
               <a:t>Click to add first-level bullet</a:t>
             </a:r>
           </a:p>
           <a:p>
             <a:pPr lvl="1"/>
             <a:r>
-              <a:rPr lang="en-US" dirty="0" smtClean="0"/>
+              <a:rPr lang="en-US" dirty="0"/>
               <a:t>Second level</a:t>
             </a:r>
           </a:p>
           <a:p>
             <a:pPr lvl="2"/>
             <a:r>
-              <a:rPr lang="en-US" dirty="0" smtClean="0"/>
+              <a:rPr lang="en-US" dirty="0"/>
               <a:t>Third level</a:t>
             </a:r>
           </a:p>
@@ -11515,7 +11195,7 @@
           <a:p>
             <a:pPr lvl="0"/>
             <a:r>
-              <a:rPr lang="en-US" dirty="0" smtClean="0"/>
+              <a:rPr lang="en-US" dirty="0"/>
               <a:t>Click to add caption</a:t>
             </a:r>
           </a:p>
@@ -11621,7 +11301,7 @@
           <a:p>
             <a:pPr lvl="0"/>
             <a:r>
-              <a:rPr lang="en-US" dirty="0" smtClean="0"/>
+              <a:rPr lang="en-US" dirty="0"/>
               <a:t>Click to add source information</a:t>
             </a:r>
           </a:p>
@@ -11633,21 +11313,6 @@
   <p:clrMapOvr>
     <a:masterClrMapping/>
   </p:clrMapOvr>
-  <mc:AlternateContent xmlns:mc="http://schemas.openxmlformats.org/markup-compatibility/2006" xmlns:p14="http://schemas.microsoft.com/office/powerpoint/2010/main">
-    <mc:Choice Requires="p14">
-      <p:transition spd="slow" p14:dur="2000"/>
-    </mc:Choice>
-    <mc:Fallback xmlns="">
-      <p:transition spd="slow"/>
-    </mc:Fallback>
-  </mc:AlternateContent>
-  <p:timing>
-    <p:tnLst>
-      <p:par>
-        <p:cTn id="1" dur="indefinite" restart="never" nodeType="tmRoot"/>
-      </p:par>
-    </p:tnLst>
-  </p:timing>
 </p:sldLayout>
 </file>
 
@@ -11748,7 +11413,7 @@
           <a:lstStyle/>
           <a:p>
             <a:r>
-              <a:rPr lang="en-US" smtClean="0"/>
+              <a:rPr lang="en-US"/>
               <a:t>Click to edit Master title style</a:t>
             </a:r>
             <a:endParaRPr lang="en-US" dirty="0"/>
@@ -11785,21 +11450,21 @@
           <a:p>
             <a:pPr lvl="0"/>
             <a:r>
-              <a:rPr lang="en-US" dirty="0" smtClean="0"/>
+              <a:rPr lang="en-US" dirty="0"/>
               <a:t>Click to add first-level bullet</a:t>
             </a:r>
           </a:p>
           <a:p>
             <a:pPr lvl="1"/>
             <a:r>
-              <a:rPr lang="en-US" dirty="0" smtClean="0"/>
+              <a:rPr lang="en-US" dirty="0"/>
               <a:t>Second level</a:t>
             </a:r>
           </a:p>
           <a:p>
             <a:pPr lvl="2"/>
             <a:r>
-              <a:rPr lang="en-US" dirty="0" smtClean="0"/>
+              <a:rPr lang="en-US" dirty="0"/>
               <a:t>Third level</a:t>
             </a:r>
           </a:p>
@@ -12018,13 +11683,6 @@
     <p:sldLayoutId id="2147483668" r:id="rId19"/>
     <p:sldLayoutId id="2147483677" r:id="rId20"/>
   </p:sldLayoutIdLst>
-  <p:timing>
-    <p:tnLst>
-      <p:par>
-        <p:cTn id="1" dur="indefinite" restart="never" nodeType="tmRoot"/>
-      </p:par>
-    </p:tnLst>
-  </p:timing>
   <p:hf hdr="0" ftr="0" dt="0"/>
   <p:txStyles>
     <p:titleStyle>
@@ -12382,10 +12040,9 @@
           <a:lstStyle/>
           <a:p>
             <a:r>
-              <a:rPr lang="en-US" dirty="0" smtClean="0"/>
+              <a:rPr lang="en-US" dirty="0"/>
               <a:t>Click to add title</a:t>
             </a:r>
-            <a:endParaRPr lang="en-US" dirty="0"/>
           </a:p>
         </p:txBody>
       </p:sp>
@@ -12634,13 +12291,6 @@
     <p:sldLayoutId id="2147483717" r:id="rId6"/>
     <p:sldLayoutId id="2147483721" r:id="rId7"/>
   </p:sldLayoutIdLst>
-  <p:timing>
-    <p:tnLst>
-      <p:par>
-        <p:cTn id="1" dur="indefinite" restart="never" nodeType="tmRoot"/>
-      </p:par>
-    </p:tnLst>
-  </p:timing>
   <p:txStyles>
     <p:titleStyle>
       <a:lvl1pPr algn="l" defTabSz="457200" rtl="0" eaLnBrk="1" latinLnBrk="0" hangingPunct="1">
@@ -12942,10 +12592,9 @@
           <a:lstStyle/>
           <a:p>
             <a:r>
-              <a:rPr lang="en-US" dirty="0" smtClean="0"/>
+              <a:rPr lang="en-US" dirty="0"/>
               <a:t>Click to add title</a:t>
             </a:r>
-            <a:endParaRPr lang="en-US" dirty="0"/>
           </a:p>
         </p:txBody>
       </p:sp>
@@ -13209,10 +12858,9 @@
           </a:lstStyle>
           <a:p>
             <a:r>
-              <a:rPr lang="en-US" dirty="0" smtClean="0"/>
+              <a:rPr lang="en-US" dirty="0"/>
               <a:t>Click to add source information</a:t>
             </a:r>
-            <a:endParaRPr lang="en-US" dirty="0"/>
           </a:p>
         </p:txBody>
       </p:sp>
@@ -13413,13 +13061,6 @@
     <p:sldLayoutId id="2147483729" r:id="rId3"/>
     <p:sldLayoutId id="2147483733" r:id="rId4"/>
   </p:sldLayoutIdLst>
-  <p:timing>
-    <p:tnLst>
-      <p:par>
-        <p:cTn id="1" dur="indefinite" restart="never" nodeType="tmRoot"/>
-      </p:par>
-    </p:tnLst>
-  </p:timing>
   <p:hf hdr="0" ftr="0" dt="0"/>
   <p:txStyles>
     <p:titleStyle>
@@ -13728,10 +13369,9 @@
           <a:lstStyle/>
           <a:p>
             <a:r>
-              <a:rPr lang="en-US" dirty="0" smtClean="0"/>
+              <a:rPr lang="en-US" dirty="0"/>
               <a:t>Protecting Soybean Farmers from a scaling trade war</a:t>
             </a:r>
-            <a:endParaRPr lang="en-US" dirty="0"/>
           </a:p>
         </p:txBody>
       </p:sp>
@@ -13751,10 +13391,15 @@
           <a:lstStyle/>
           <a:p>
             <a:r>
-              <a:rPr lang="en-US" dirty="0" smtClean="0"/>
+              <a:rPr lang="en-US" dirty="0"/>
               <a:t>Jose Montes de Oca</a:t>
             </a:r>
-            <a:endParaRPr lang="en-US" dirty="0"/>
+          </a:p>
+          <a:p>
+            <a:r>
+              <a:rPr lang="en-US" dirty="0"/>
+              <a:t>Available: https://github.com/josber86/soybeananalysis</a:t>
+            </a:r>
           </a:p>
         </p:txBody>
       </p:sp>
@@ -13805,13 +13450,8 @@
           <a:p>
             <a:r>
               <a:rPr lang="en-US" dirty="0"/>
-              <a:t>Regression </a:t>
-            </a:r>
-            <a:r>
-              <a:rPr lang="en-US" dirty="0" smtClean="0"/>
-              <a:t>findings (cont.)</a:t>
-            </a:r>
-            <a:endParaRPr lang="en-US" dirty="0"/>
+              <a:t>Regression findings (cont.)</a:t>
+            </a:r>
           </a:p>
         </p:txBody>
       </p:sp>
@@ -13941,55 +13581,34 @@
           <a:p>
             <a:r>
               <a:rPr lang="en-US" dirty="0"/>
-              <a:t>At the Macro Level – Depress the value of the </a:t>
-            </a:r>
-            <a:r>
-              <a:rPr lang="en-US" dirty="0" smtClean="0"/>
-              <a:t>Dollar </a:t>
+              <a:t>At the Macro Level – Depress the value of the Dollar </a:t>
             </a:r>
             <a:br>
-              <a:rPr lang="en-US" dirty="0" smtClean="0"/>
+              <a:rPr lang="en-US" dirty="0"/>
             </a:br>
             <a:r>
-              <a:rPr lang="en-US" dirty="0" smtClean="0"/>
+              <a:rPr lang="en-US" dirty="0"/>
               <a:t>(print, print, print)</a:t>
             </a:r>
-            <a:endParaRPr lang="en-US" dirty="0"/>
           </a:p>
           <a:p>
             <a:r>
               <a:rPr lang="en-US" dirty="0"/>
               <a:t>At the Micro Level – subsidies tied to Gas Prices </a:t>
             </a:r>
-            <a:r>
-              <a:rPr lang="en-US" dirty="0" smtClean="0"/>
-              <a:t/>
-            </a:r>
             <a:br>
-              <a:rPr lang="en-US" dirty="0" smtClean="0"/>
+              <a:rPr lang="en-US" dirty="0"/>
             </a:br>
             <a:r>
-              <a:rPr lang="en-US" dirty="0" smtClean="0"/>
-              <a:t>or </a:t>
-            </a:r>
-            <a:r>
-              <a:rPr lang="en-US" dirty="0"/>
-              <a:t>increase domestic soy consumption </a:t>
-            </a:r>
-            <a:r>
-              <a:rPr lang="en-US" dirty="0" smtClean="0"/>
-              <a:t/>
+              <a:rPr lang="en-US" dirty="0"/>
+              <a:t>or increase domestic soy consumption </a:t>
             </a:r>
             <a:br>
-              <a:rPr lang="en-US" dirty="0" smtClean="0"/>
+              <a:rPr lang="en-US" dirty="0"/>
             </a:br>
             <a:r>
-              <a:rPr lang="en-US" dirty="0" smtClean="0"/>
-              <a:t>(</a:t>
-            </a:r>
-            <a:r>
-              <a:rPr lang="en-US" dirty="0"/>
-              <a:t>bio fuel, increase meat consumption, or meat exports) </a:t>
+              <a:rPr lang="en-US" dirty="0"/>
+              <a:t>(bio fuel, increase meat consumption, or meat exports) </a:t>
             </a:r>
           </a:p>
         </p:txBody>
@@ -14041,8 +13660,20 @@
             <a:tbl>
               <a:tblPr/>
               <a:tblGrid>
-                <a:gridCol w="803560"/>
-                <a:gridCol w="2260013"/>
+                <a:gridCol w="803560">
+                  <a:extLst>
+                    <a:ext uri="{9D8B030D-6E8A-4147-A177-3AD203B41FA5}">
+                      <a16:colId xmlns:a16="http://schemas.microsoft.com/office/drawing/2014/main" val="20000"/>
+                    </a:ext>
+                  </a:extLst>
+                </a:gridCol>
+                <a:gridCol w="2260013">
+                  <a:extLst>
+                    <a:ext uri="{9D8B030D-6E8A-4147-A177-3AD203B41FA5}">
+                      <a16:colId xmlns:a16="http://schemas.microsoft.com/office/drawing/2014/main" val="20001"/>
+                    </a:ext>
+                  </a:extLst>
+                </a:gridCol>
               </a:tblGrid>
               <a:tr h="145530">
                 <a:tc>
@@ -14165,6 +13796,11 @@
                     </a:solidFill>
                   </a:tcPr>
                 </a:tc>
+                <a:extLst>
+                  <a:ext uri="{0D108BD9-81ED-4DB2-BD59-A6C34878D82A}">
+                    <a16:rowId xmlns:a16="http://schemas.microsoft.com/office/drawing/2014/main" val="10000"/>
+                  </a:ext>
+                </a:extLst>
               </a:tr>
               <a:tr h="145530">
                 <a:tc>
@@ -14281,6 +13917,11 @@
                     </a:lnB>
                   </a:tcPr>
                 </a:tc>
+                <a:extLst>
+                  <a:ext uri="{0D108BD9-81ED-4DB2-BD59-A6C34878D82A}">
+                    <a16:rowId xmlns:a16="http://schemas.microsoft.com/office/drawing/2014/main" val="10001"/>
+                  </a:ext>
+                </a:extLst>
               </a:tr>
               <a:tr h="145530">
                 <a:tc>
@@ -14397,6 +14038,11 @@
                     </a:lnB>
                   </a:tcPr>
                 </a:tc>
+                <a:extLst>
+                  <a:ext uri="{0D108BD9-81ED-4DB2-BD59-A6C34878D82A}">
+                    <a16:rowId xmlns:a16="http://schemas.microsoft.com/office/drawing/2014/main" val="10002"/>
+                  </a:ext>
+                </a:extLst>
               </a:tr>
               <a:tr h="145530">
                 <a:tc>
@@ -14513,6 +14159,11 @@
                     </a:lnB>
                   </a:tcPr>
                 </a:tc>
+                <a:extLst>
+                  <a:ext uri="{0D108BD9-81ED-4DB2-BD59-A6C34878D82A}">
+                    <a16:rowId xmlns:a16="http://schemas.microsoft.com/office/drawing/2014/main" val="10003"/>
+                  </a:ext>
+                </a:extLst>
               </a:tr>
               <a:tr h="145530">
                 <a:tc>
@@ -14629,6 +14280,11 @@
                     </a:lnB>
                   </a:tcPr>
                 </a:tc>
+                <a:extLst>
+                  <a:ext uri="{0D108BD9-81ED-4DB2-BD59-A6C34878D82A}">
+                    <a16:rowId xmlns:a16="http://schemas.microsoft.com/office/drawing/2014/main" val="10004"/>
+                  </a:ext>
+                </a:extLst>
               </a:tr>
               <a:tr h="145530">
                 <a:tc>
@@ -14745,6 +14401,11 @@
                     </a:lnB>
                   </a:tcPr>
                 </a:tc>
+                <a:extLst>
+                  <a:ext uri="{0D108BD9-81ED-4DB2-BD59-A6C34878D82A}">
+                    <a16:rowId xmlns:a16="http://schemas.microsoft.com/office/drawing/2014/main" val="10005"/>
+                  </a:ext>
+                </a:extLst>
               </a:tr>
               <a:tr h="145530">
                 <a:tc>
@@ -14861,6 +14522,11 @@
                     </a:lnB>
                   </a:tcPr>
                 </a:tc>
+                <a:extLst>
+                  <a:ext uri="{0D108BD9-81ED-4DB2-BD59-A6C34878D82A}">
+                    <a16:rowId xmlns:a16="http://schemas.microsoft.com/office/drawing/2014/main" val="10006"/>
+                  </a:ext>
+                </a:extLst>
               </a:tr>
               <a:tr h="145530">
                 <a:tc>
@@ -14977,6 +14643,11 @@
                     </a:lnB>
                   </a:tcPr>
                 </a:tc>
+                <a:extLst>
+                  <a:ext uri="{0D108BD9-81ED-4DB2-BD59-A6C34878D82A}">
+                    <a16:rowId xmlns:a16="http://schemas.microsoft.com/office/drawing/2014/main" val="10007"/>
+                  </a:ext>
+                </a:extLst>
               </a:tr>
               <a:tr h="145530">
                 <a:tc>
@@ -15093,6 +14764,11 @@
                     </a:lnB>
                   </a:tcPr>
                 </a:tc>
+                <a:extLst>
+                  <a:ext uri="{0D108BD9-81ED-4DB2-BD59-A6C34878D82A}">
+                    <a16:rowId xmlns:a16="http://schemas.microsoft.com/office/drawing/2014/main" val="10008"/>
+                  </a:ext>
+                </a:extLst>
               </a:tr>
               <a:tr h="145530">
                 <a:tc>
@@ -15209,6 +14885,11 @@
                     </a:lnB>
                   </a:tcPr>
                 </a:tc>
+                <a:extLst>
+                  <a:ext uri="{0D108BD9-81ED-4DB2-BD59-A6C34878D82A}">
+                    <a16:rowId xmlns:a16="http://schemas.microsoft.com/office/drawing/2014/main" val="10009"/>
+                  </a:ext>
+                </a:extLst>
               </a:tr>
               <a:tr h="145530">
                 <a:tc>
@@ -15325,6 +15006,11 @@
                     </a:lnB>
                   </a:tcPr>
                 </a:tc>
+                <a:extLst>
+                  <a:ext uri="{0D108BD9-81ED-4DB2-BD59-A6C34878D82A}">
+                    <a16:rowId xmlns:a16="http://schemas.microsoft.com/office/drawing/2014/main" val="10010"/>
+                  </a:ext>
+                </a:extLst>
               </a:tr>
               <a:tr h="145530">
                 <a:tc>
@@ -15441,6 +15127,11 @@
                     </a:lnB>
                   </a:tcPr>
                 </a:tc>
+                <a:extLst>
+                  <a:ext uri="{0D108BD9-81ED-4DB2-BD59-A6C34878D82A}">
+                    <a16:rowId xmlns:a16="http://schemas.microsoft.com/office/drawing/2014/main" val="10011"/>
+                  </a:ext>
+                </a:extLst>
               </a:tr>
               <a:tr h="145530">
                 <a:tc>
@@ -15557,6 +15248,11 @@
                     </a:lnB>
                   </a:tcPr>
                 </a:tc>
+                <a:extLst>
+                  <a:ext uri="{0D108BD9-81ED-4DB2-BD59-A6C34878D82A}">
+                    <a16:rowId xmlns:a16="http://schemas.microsoft.com/office/drawing/2014/main" val="10012"/>
+                  </a:ext>
+                </a:extLst>
               </a:tr>
               <a:tr h="145530">
                 <a:tc>
@@ -15673,6 +15369,11 @@
                     </a:lnB>
                   </a:tcPr>
                 </a:tc>
+                <a:extLst>
+                  <a:ext uri="{0D108BD9-81ED-4DB2-BD59-A6C34878D82A}">
+                    <a16:rowId xmlns:a16="http://schemas.microsoft.com/office/drawing/2014/main" val="10013"/>
+                  </a:ext>
+                </a:extLst>
               </a:tr>
               <a:tr h="145530">
                 <a:tc>
@@ -15789,6 +15490,11 @@
                     </a:lnB>
                   </a:tcPr>
                 </a:tc>
+                <a:extLst>
+                  <a:ext uri="{0D108BD9-81ED-4DB2-BD59-A6C34878D82A}">
+                    <a16:rowId xmlns:a16="http://schemas.microsoft.com/office/drawing/2014/main" val="10014"/>
+                  </a:ext>
+                </a:extLst>
               </a:tr>
               <a:tr h="145530">
                 <a:tc>
@@ -15905,6 +15611,11 @@
                     </a:lnB>
                   </a:tcPr>
                 </a:tc>
+                <a:extLst>
+                  <a:ext uri="{0D108BD9-81ED-4DB2-BD59-A6C34878D82A}">
+                    <a16:rowId xmlns:a16="http://schemas.microsoft.com/office/drawing/2014/main" val="10015"/>
+                  </a:ext>
+                </a:extLst>
               </a:tr>
             </a:tbl>
           </a:graphicData>
@@ -15983,15 +15694,7 @@
           <a:p>
             <a:r>
               <a:rPr lang="en-US" dirty="0"/>
-              <a:t>What is of supreme importance in war is to attack the enemy's strategy </a:t>
-            </a:r>
-            <a:r>
-              <a:rPr lang="en-US" dirty="0" smtClean="0"/>
-              <a:t>– Sun Tzu in the Art of War </a:t>
-            </a:r>
-            <a:r>
-              <a:rPr lang="en-US" dirty="0"/>
-              <a:t/>
+              <a:t>What is of supreme importance in war is to attack the enemy's strategy – Sun Tzu in the Art of War </a:t>
             </a:r>
             <a:br>
               <a:rPr lang="en-US" dirty="0"/>
@@ -16267,35 +15970,27 @@
           <a:lstStyle/>
           <a:p>
             <a:r>
-              <a:rPr lang="en-US" dirty="0" smtClean="0"/>
-              <a:t>52 Week interval really shows a </a:t>
-            </a:r>
-            <a:r>
-              <a:rPr lang="en-US" dirty="0" smtClean="0"/>
-              <a:t>trend</a:t>
+              <a:rPr lang="en-US" dirty="0"/>
+              <a:t>52 Week interval really shows a trend</a:t>
             </a:r>
           </a:p>
           <a:p>
             <a:endParaRPr lang="en-US" dirty="0"/>
           </a:p>
           <a:p>
-            <a:endParaRPr lang="en-US" dirty="0" smtClean="0"/>
-          </a:p>
-          <a:p>
             <a:endParaRPr lang="en-US" dirty="0"/>
           </a:p>
           <a:p>
-            <a:r>
-              <a:rPr lang="en-US" dirty="0" smtClean="0"/>
-              <a:t>Analysis </a:t>
-            </a:r>
-            <a:r>
-              <a:rPr lang="en-US" dirty="0" smtClean="0"/>
-              <a:t>using package TTR confirms this:</a:t>
-            </a:r>
-          </a:p>
-          <a:p>
-            <a:endParaRPr lang="en-US" dirty="0" smtClean="0"/>
+            <a:endParaRPr lang="en-US" dirty="0"/>
+          </a:p>
+          <a:p>
+            <a:r>
+              <a:rPr lang="en-US" dirty="0"/>
+              <a:t>Analysis using package TTR confirms this:</a:t>
+            </a:r>
+          </a:p>
+          <a:p>
+            <a:endParaRPr lang="en-US" dirty="0"/>
           </a:p>
           <a:p>
             <a:pPr marL="1588" indent="0">
@@ -16430,10 +16125,6 @@
               </a:rPr>
               <a:t>https://fgisonline.ams.usda.gov/ExportGrainReport/</a:t>
             </a:r>
-            <a:r>
-              <a:rPr lang="en-US" dirty="0"/>
-              <a:t/>
-            </a:r>
             <a:br>
               <a:rPr lang="en-US" dirty="0"/>
             </a:br>
@@ -16585,55 +16276,33 @@
           <a:lstStyle/>
           <a:p>
             <a:r>
-              <a:rPr lang="en-US" sz="1200" dirty="0" smtClean="0"/>
-              <a:t>Hypothesis Testing. Did the Growth Rate change </a:t>
-            </a:r>
-            <a:r>
-              <a:rPr lang="en-US" sz="1200" dirty="0" smtClean="0"/>
-              <a:t>from last 8 months from historical average</a:t>
-            </a:r>
-            <a:r>
-              <a:rPr lang="en-US" sz="1200" dirty="0" smtClean="0"/>
-              <a:t>? </a:t>
-            </a:r>
-            <a:r>
-              <a:rPr lang="en-US" sz="1200" dirty="0" smtClean="0"/>
-              <a:t>Tweet in March </a:t>
-            </a:r>
-          </a:p>
-          <a:p>
-            <a:r>
-              <a:rPr lang="en-US" sz="1200" dirty="0" smtClean="0"/>
+              <a:rPr lang="en-US" sz="1200" dirty="0"/>
+              <a:t>Hypothesis Testing. Did the Growth Rate change from last 8 months from historical average? Tweet in March </a:t>
+            </a:r>
+          </a:p>
+          <a:p>
+            <a:r>
+              <a:rPr lang="en-US" sz="1200" dirty="0"/>
               <a:t>Null Hypothesis: </a:t>
             </a:r>
             <a:r>
-              <a:rPr lang="en-US" sz="1200" dirty="0" smtClean="0">
+              <a:rPr lang="en-US" sz="1200" dirty="0">
                 <a:sym typeface="Symbol" panose="05050102010706020507" pitchFamily="18" charset="2"/>
               </a:rPr>
               <a:t> = 0.3976</a:t>
             </a:r>
-            <a:endParaRPr lang="en-US" sz="1200" dirty="0" smtClean="0"/>
-          </a:p>
-          <a:p>
-            <a:r>
-              <a:rPr lang="en-US" sz="1200" dirty="0" smtClean="0"/>
-              <a:t>Alternative </a:t>
-            </a:r>
-            <a:r>
-              <a:rPr lang="en-US" sz="1200" dirty="0" smtClean="0"/>
-              <a:t>Hypothesis: </a:t>
+            <a:endParaRPr lang="en-US" sz="1200" dirty="0"/>
+          </a:p>
+          <a:p>
+            <a:r>
+              <a:rPr lang="en-US" sz="1200" dirty="0"/>
+              <a:t>Alternative Hypothesis: </a:t>
             </a:r>
             <a:r>
               <a:rPr lang="en-US" sz="1200" dirty="0">
                 <a:sym typeface="Symbol" panose="05050102010706020507" pitchFamily="18" charset="2"/>
               </a:rPr>
-              <a:t> </a:t>
-            </a:r>
-            <a:r>
-              <a:rPr lang="en-US" sz="1200" dirty="0" smtClean="0">
-                <a:sym typeface="Symbol" panose="05050102010706020507" pitchFamily="18" charset="2"/>
-              </a:rPr>
-              <a:t>≠ 0.3976</a:t>
+              <a:t> ≠ 0.3976</a:t>
             </a:r>
           </a:p>
           <a:p>
@@ -16641,7 +16310,7 @@
               <a:buNone/>
             </a:pPr>
             <a:r>
-              <a:rPr lang="en-US" sz="1200" dirty="0" smtClean="0"/>
+              <a:rPr lang="en-US" sz="1200" dirty="0"/>
               <a:t>Sample size = 9</a:t>
             </a:r>
           </a:p>
@@ -16650,7 +16319,7 @@
               <a:buNone/>
             </a:pPr>
             <a:r>
-              <a:rPr lang="en-US" sz="1200" dirty="0" smtClean="0"/>
+              <a:rPr lang="en-US" sz="1200" dirty="0"/>
               <a:t>Using a t-Test: t = (-.0565 – 0.3976) / (.9194)/ √9 = -1.481727</a:t>
             </a:r>
           </a:p>
@@ -16659,15 +16328,15 @@
               <a:buNone/>
             </a:pPr>
             <a:r>
-              <a:rPr lang="en-US" sz="1200" dirty="0" smtClean="0"/>
+              <a:rPr lang="en-US" sz="1200" dirty="0"/>
               <a:t>Probability </a:t>
             </a:r>
             <a:r>
-              <a:rPr lang="en-US" sz="1200" dirty="0" err="1" smtClean="0"/>
+              <a:rPr lang="en-US" sz="1200" dirty="0" err="1"/>
               <a:t>df</a:t>
             </a:r>
             <a:r>
-              <a:rPr lang="en-US" sz="1200" dirty="0" smtClean="0"/>
+              <a:rPr lang="en-US" sz="1200" dirty="0"/>
               <a:t> =8 t = +/- 2.306 alpha = .05</a:t>
             </a:r>
           </a:p>
@@ -16676,7 +16345,7 @@
               <a:buNone/>
             </a:pPr>
             <a:r>
-              <a:rPr lang="en-US" sz="1200" dirty="0" smtClean="0"/>
+              <a:rPr lang="en-US" sz="1200" dirty="0"/>
               <a:t>We fail to reject the Null so we see no signs of slowdown yet. So we must prepare!</a:t>
             </a:r>
           </a:p>
@@ -16685,7 +16354,7 @@
               <a:buNone/>
             </a:pPr>
             <a:r>
-              <a:rPr lang="en-US" sz="1200" dirty="0" smtClean="0">
+              <a:rPr lang="en-US" sz="1200" dirty="0">
                 <a:solidFill>
                   <a:srgbClr val="FF0000"/>
                 </a:solidFill>
@@ -16693,7 +16362,7 @@
               <a:t>Notice we reject at </a:t>
             </a:r>
             <a:r>
-              <a:rPr lang="en-US" sz="1200" dirty="0" err="1" smtClean="0">
+              <a:rPr lang="en-US" sz="1200" dirty="0" err="1">
                 <a:solidFill>
                   <a:srgbClr val="FF0000"/>
                 </a:solidFill>
@@ -16701,50 +16370,13 @@
               <a:t>df</a:t>
             </a:r>
             <a:r>
-              <a:rPr lang="en-US" sz="1200" dirty="0" smtClean="0">
-                <a:solidFill>
-                  <a:srgbClr val="FF0000"/>
-                </a:solidFill>
-              </a:rPr>
-              <a:t> </a:t>
-            </a:r>
-            <a:r>
               <a:rPr lang="en-US" sz="1200" dirty="0">
                 <a:solidFill>
                   <a:srgbClr val="FF0000"/>
                 </a:solidFill>
               </a:rPr>
-              <a:t>=8 t = +/- </a:t>
-            </a:r>
-            <a:r>
-              <a:rPr lang="en-US" sz="1200" dirty="0" smtClean="0">
-                <a:solidFill>
-                  <a:srgbClr val="FF0000"/>
-                </a:solidFill>
-              </a:rPr>
-              <a:t>1.397 </a:t>
-            </a:r>
-            <a:r>
-              <a:rPr lang="en-US" sz="1200" dirty="0">
-                <a:solidFill>
-                  <a:srgbClr val="FF0000"/>
-                </a:solidFill>
-              </a:rPr>
-              <a:t>alpha = </a:t>
-            </a:r>
-            <a:r>
-              <a:rPr lang="en-US" sz="1200" dirty="0" smtClean="0">
-                <a:solidFill>
-                  <a:srgbClr val="FF0000"/>
-                </a:solidFill>
-              </a:rPr>
-              <a:t>.2</a:t>
-            </a:r>
-            <a:endParaRPr lang="en-US" sz="1200" dirty="0">
-              <a:solidFill>
-                <a:srgbClr val="FF0000"/>
-              </a:solidFill>
-            </a:endParaRPr>
+              <a:t> =8 t = +/- 1.397 alpha = .2</a:t>
+            </a:r>
           </a:p>
           <a:p>
             <a:pPr marL="1588" indent="0">
@@ -16803,9 +16435,27 @@
                 <a:tableStyleId>{5C22544A-7EE6-4342-B048-85BDC9FD1C3A}</a:tableStyleId>
               </a:tblPr>
               <a:tblGrid>
-                <a:gridCol w="789669"/>
-                <a:gridCol w="1456478"/>
-                <a:gridCol w="1314818"/>
+                <a:gridCol w="789669">
+                  <a:extLst>
+                    <a:ext uri="{9D8B030D-6E8A-4147-A177-3AD203B41FA5}">
+                      <a16:colId xmlns:a16="http://schemas.microsoft.com/office/drawing/2014/main" val="20000"/>
+                    </a:ext>
+                  </a:extLst>
+                </a:gridCol>
+                <a:gridCol w="1456478">
+                  <a:extLst>
+                    <a:ext uri="{9D8B030D-6E8A-4147-A177-3AD203B41FA5}">
+                      <a16:colId xmlns:a16="http://schemas.microsoft.com/office/drawing/2014/main" val="20001"/>
+                    </a:ext>
+                  </a:extLst>
+                </a:gridCol>
+                <a:gridCol w="1314818">
+                  <a:extLst>
+                    <a:ext uri="{9D8B030D-6E8A-4147-A177-3AD203B41FA5}">
+                      <a16:colId xmlns:a16="http://schemas.microsoft.com/office/drawing/2014/main" val="20002"/>
+                    </a:ext>
+                  </a:extLst>
+                </a:gridCol>
               </a:tblGrid>
               <a:tr h="150604">
                 <a:tc>
@@ -16877,6 +16527,11 @@
                   </a:txBody>
                   <a:tcPr marL="7620" marR="7620" marT="7620" marB="0" anchor="b"/>
                 </a:tc>
+                <a:extLst>
+                  <a:ext uri="{0D108BD9-81ED-4DB2-BD59-A6C34878D82A}">
+                    <a16:rowId xmlns:a16="http://schemas.microsoft.com/office/drawing/2014/main" val="10000"/>
+                  </a:ext>
+                </a:extLst>
               </a:tr>
               <a:tr h="150604">
                 <a:tc>
@@ -16956,6 +16611,11 @@
                     </a:solidFill>
                   </a:tcPr>
                 </a:tc>
+                <a:extLst>
+                  <a:ext uri="{0D108BD9-81ED-4DB2-BD59-A6C34878D82A}">
+                    <a16:rowId xmlns:a16="http://schemas.microsoft.com/office/drawing/2014/main" val="10001"/>
+                  </a:ext>
+                </a:extLst>
               </a:tr>
               <a:tr h="0">
                 <a:tc>
@@ -17035,6 +16695,11 @@
                     </a:solidFill>
                   </a:tcPr>
                 </a:tc>
+                <a:extLst>
+                  <a:ext uri="{0D108BD9-81ED-4DB2-BD59-A6C34878D82A}">
+                    <a16:rowId xmlns:a16="http://schemas.microsoft.com/office/drawing/2014/main" val="10002"/>
+                  </a:ext>
+                </a:extLst>
               </a:tr>
               <a:tr h="150604">
                 <a:tc>
@@ -17114,6 +16779,11 @@
                     </a:solidFill>
                   </a:tcPr>
                 </a:tc>
+                <a:extLst>
+                  <a:ext uri="{0D108BD9-81ED-4DB2-BD59-A6C34878D82A}">
+                    <a16:rowId xmlns:a16="http://schemas.microsoft.com/office/drawing/2014/main" val="10003"/>
+                  </a:ext>
+                </a:extLst>
               </a:tr>
               <a:tr h="150604">
                 <a:tc>
@@ -17193,6 +16863,11 @@
                     </a:solidFill>
                   </a:tcPr>
                 </a:tc>
+                <a:extLst>
+                  <a:ext uri="{0D108BD9-81ED-4DB2-BD59-A6C34878D82A}">
+                    <a16:rowId xmlns:a16="http://schemas.microsoft.com/office/drawing/2014/main" val="10004"/>
+                  </a:ext>
+                </a:extLst>
               </a:tr>
               <a:tr h="150604">
                 <a:tc>
@@ -17272,6 +16947,11 @@
                     </a:solidFill>
                   </a:tcPr>
                 </a:tc>
+                <a:extLst>
+                  <a:ext uri="{0D108BD9-81ED-4DB2-BD59-A6C34878D82A}">
+                    <a16:rowId xmlns:a16="http://schemas.microsoft.com/office/drawing/2014/main" val="10005"/>
+                  </a:ext>
+                </a:extLst>
               </a:tr>
               <a:tr h="150604">
                 <a:tc>
@@ -17351,6 +17031,11 @@
                     </a:solidFill>
                   </a:tcPr>
                 </a:tc>
+                <a:extLst>
+                  <a:ext uri="{0D108BD9-81ED-4DB2-BD59-A6C34878D82A}">
+                    <a16:rowId xmlns:a16="http://schemas.microsoft.com/office/drawing/2014/main" val="10006"/>
+                  </a:ext>
+                </a:extLst>
               </a:tr>
               <a:tr h="150604">
                 <a:tc>
@@ -17430,6 +17115,11 @@
                     </a:solidFill>
                   </a:tcPr>
                 </a:tc>
+                <a:extLst>
+                  <a:ext uri="{0D108BD9-81ED-4DB2-BD59-A6C34878D82A}">
+                    <a16:rowId xmlns:a16="http://schemas.microsoft.com/office/drawing/2014/main" val="10007"/>
+                  </a:ext>
+                </a:extLst>
               </a:tr>
               <a:tr h="150604">
                 <a:tc>
@@ -17509,6 +17199,11 @@
                     </a:solidFill>
                   </a:tcPr>
                 </a:tc>
+                <a:extLst>
+                  <a:ext uri="{0D108BD9-81ED-4DB2-BD59-A6C34878D82A}">
+                    <a16:rowId xmlns:a16="http://schemas.microsoft.com/office/drawing/2014/main" val="10008"/>
+                  </a:ext>
+                </a:extLst>
               </a:tr>
               <a:tr h="150604">
                 <a:tc>
@@ -17606,6 +17301,11 @@
                     </a:solidFill>
                   </a:tcPr>
                 </a:tc>
+                <a:extLst>
+                  <a:ext uri="{0D108BD9-81ED-4DB2-BD59-A6C34878D82A}">
+                    <a16:rowId xmlns:a16="http://schemas.microsoft.com/office/drawing/2014/main" val="10009"/>
+                  </a:ext>
+                </a:extLst>
               </a:tr>
               <a:tr h="150604">
                 <a:tc>
@@ -17755,6 +17455,11 @@
                     </a:lnB>
                   </a:tcPr>
                 </a:tc>
+                <a:extLst>
+                  <a:ext uri="{0D108BD9-81ED-4DB2-BD59-A6C34878D82A}">
+                    <a16:rowId xmlns:a16="http://schemas.microsoft.com/office/drawing/2014/main" val="10010"/>
+                  </a:ext>
+                </a:extLst>
               </a:tr>
               <a:tr h="150604">
                 <a:tc>
@@ -17904,6 +17609,11 @@
                     </a:lnB>
                   </a:tcPr>
                 </a:tc>
+                <a:extLst>
+                  <a:ext uri="{0D108BD9-81ED-4DB2-BD59-A6C34878D82A}">
+                    <a16:rowId xmlns:a16="http://schemas.microsoft.com/office/drawing/2014/main" val="10011"/>
+                  </a:ext>
+                </a:extLst>
               </a:tr>
               <a:tr h="150604">
                 <a:tc>
@@ -18053,6 +17763,11 @@
                     </a:lnB>
                   </a:tcPr>
                 </a:tc>
+                <a:extLst>
+                  <a:ext uri="{0D108BD9-81ED-4DB2-BD59-A6C34878D82A}">
+                    <a16:rowId xmlns:a16="http://schemas.microsoft.com/office/drawing/2014/main" val="10012"/>
+                  </a:ext>
+                </a:extLst>
               </a:tr>
             </a:tbl>
           </a:graphicData>
@@ -18369,13 +18084,8 @@
           <a:p>
             <a:r>
               <a:rPr lang="en-US" dirty="0"/>
-              <a:t>Regression </a:t>
-            </a:r>
-            <a:r>
-              <a:rPr lang="en-US" dirty="0" smtClean="0"/>
-              <a:t>findings</a:t>
-            </a:r>
-            <a:endParaRPr lang="en-US" dirty="0"/>
+              <a:t>Regression findings</a:t>
+            </a:r>
           </a:p>
         </p:txBody>
       </p:sp>

</xml_diff>